<commit_message>
add AI Ethics working group session + ML in action
</commit_message>
<xml_diff>
--- a/presentations/session-10-machine-learning-in-action.pptx
+++ b/presentations/session-10-machine-learning-in-action.pptx
@@ -5,13 +5,12 @@
     <p:sldMasterId id="2147483648" r:id="rId1"/>
   </p:sldMasterIdLst>
   <p:notesMasterIdLst>
-    <p:notesMasterId r:id="rId6"/>
+    <p:notesMasterId r:id="rId5"/>
   </p:notesMasterIdLst>
   <p:sldIdLst>
     <p:sldId id="263" r:id="rId2"/>
     <p:sldId id="538" r:id="rId3"/>
-    <p:sldId id="542" r:id="rId4"/>
-    <p:sldId id="543" r:id="rId5"/>
+    <p:sldId id="544" r:id="rId4"/>
   </p:sldIdLst>
   <p:sldSz cx="12192000" cy="6858000"/>
   <p:notesSz cx="6797675" cy="9874250"/>
@@ -211,7 +210,7 @@
           <a:p>
             <a:fld id="{74B0C4F4-A186-4C13-8E85-1B7149B65718}" type="datetimeFigureOut">
               <a:rPr lang="en-US" smtClean="0"/>
-              <a:t>10/23/18</a:t>
+              <a:t>11/21/18</a:t>
             </a:fld>
             <a:endParaRPr lang="en-US"/>
           </a:p>
@@ -724,95 +723,7 @@
     </p:spTree>
     <p:extLst>
       <p:ext uri="{BB962C8B-B14F-4D97-AF65-F5344CB8AC3E}">
-        <p14:creationId xmlns:p14="http://schemas.microsoft.com/office/powerpoint/2010/main" val="2558065195"/>
-      </p:ext>
-    </p:extLst>
-  </p:cSld>
-  <p:clrMapOvr>
-    <a:masterClrMapping/>
-  </p:clrMapOvr>
-</p:notes>
-</file>
-
-<file path=ppt/notesSlides/notesSlide4.xml><?xml version="1.0" encoding="utf-8"?>
-<p:notes xmlns:a="http://schemas.openxmlformats.org/drawingml/2006/main" xmlns:r="http://schemas.openxmlformats.org/officeDocument/2006/relationships" xmlns:p="http://schemas.openxmlformats.org/presentationml/2006/main">
-  <p:cSld>
-    <p:spTree>
-      <p:nvGrpSpPr>
-        <p:cNvPr id="1" name=""/>
-        <p:cNvGrpSpPr/>
-        <p:nvPr/>
-      </p:nvGrpSpPr>
-      <p:grpSpPr>
-        <a:xfrm>
-          <a:off x="0" y="0"/>
-          <a:ext cx="0" cy="0"/>
-          <a:chOff x="0" y="0"/>
-          <a:chExt cx="0" cy="0"/>
-        </a:xfrm>
-      </p:grpSpPr>
-      <p:sp>
-        <p:nvSpPr>
-          <p:cNvPr id="2" name="Slide Image Placeholder 1"/>
-          <p:cNvSpPr>
-            <a:spLocks noGrp="1" noRot="1" noChangeAspect="1"/>
-          </p:cNvSpPr>
-          <p:nvPr>
-            <p:ph type="sldImg"/>
-          </p:nvPr>
-        </p:nvSpPr>
-        <p:spPr/>
-      </p:sp>
-      <p:sp>
-        <p:nvSpPr>
-          <p:cNvPr id="3" name="Notes Placeholder 2"/>
-          <p:cNvSpPr>
-            <a:spLocks noGrp="1"/>
-          </p:cNvSpPr>
-          <p:nvPr>
-            <p:ph type="body" idx="1"/>
-          </p:nvPr>
-        </p:nvSpPr>
-        <p:spPr/>
-        <p:txBody>
-          <a:bodyPr/>
-          <a:lstStyle/>
-          <a:p>
-            <a:pPr marL="171450" indent="-171450">
-              <a:buFont typeface="Arial" panose="020B0604020202020204" pitchFamily="34" charset="0"/>
-              <a:buChar char="•"/>
-            </a:pPr>
-            <a:endParaRPr lang="en-US" dirty="0"/>
-          </a:p>
-        </p:txBody>
-      </p:sp>
-      <p:sp>
-        <p:nvSpPr>
-          <p:cNvPr id="4" name="Slide Number Placeholder 3"/>
-          <p:cNvSpPr>
-            <a:spLocks noGrp="1"/>
-          </p:cNvSpPr>
-          <p:nvPr>
-            <p:ph type="sldNum" sz="quarter" idx="10"/>
-          </p:nvPr>
-        </p:nvSpPr>
-        <p:spPr/>
-        <p:txBody>
-          <a:bodyPr/>
-          <a:lstStyle/>
-          <a:p>
-            <a:fld id="{2F6F93F9-6E01-423B-ABB3-8FB3B0651941}" type="slidenum">
-              <a:rPr lang="en-US" smtClean="0"/>
-              <a:t>4</a:t>
-            </a:fld>
-            <a:endParaRPr lang="en-US"/>
-          </a:p>
-        </p:txBody>
-      </p:sp>
-    </p:spTree>
-    <p:extLst>
-      <p:ext uri="{BB962C8B-B14F-4D97-AF65-F5344CB8AC3E}">
-        <p14:creationId xmlns:p14="http://schemas.microsoft.com/office/powerpoint/2010/main" val="1147099167"/>
+        <p14:creationId xmlns:p14="http://schemas.microsoft.com/office/powerpoint/2010/main" val="3802785815"/>
       </p:ext>
     </p:extLst>
   </p:cSld>
@@ -3633,7 +3544,7 @@
         <p:spPr>
           <a:xfrm>
             <a:off x="1263001" y="2050947"/>
-            <a:ext cx="9909364" cy="3416320"/>
+            <a:ext cx="9909364" cy="3046988"/>
           </a:xfrm>
           <a:prstGeom prst="rect">
             <a:avLst/>
@@ -3657,7 +3568,7 @@
                 </a:solidFill>
                 <a:latin typeface="Cambria" panose="02040503050406030204" pitchFamily="18" charset="0"/>
               </a:rPr>
-              <a:t>BUILD A LOCAL EARLY WARGNIN SYSTEMS TO ACCURATELY PREDICT DANGEROUS LEVELS OF AIR POLLUTANTS</a:t>
+              <a:t>SURVEY OF ONLINE DEMO OF DEEP LEARNING IN THE FIELD OF IMAGE RECOGNITION, GENERATIVE NN, ASSISTANTS, …</a:t>
             </a:r>
             <a:br>
               <a:rPr lang="en-US" sz="2400" b="1" dirty="0">
@@ -3686,7 +3597,7 @@
                 </a:solidFill>
                 <a:latin typeface="Cambria" panose="02040503050406030204" pitchFamily="18" charset="0"/>
               </a:rPr>
-              <a:t>GIVE A BIRD’S EYE VIEW OF A STATE-OF-THE-ART MACHINE LEARNING PIPELINE</a:t>
+              <a:t>NUTS-AND-BOLTS OF MOUVEMENT DETECTION</a:t>
             </a:r>
             <a:br>
               <a:rPr lang="en-US" sz="2400" b="1" dirty="0">
@@ -3715,7 +3626,7 @@
                 </a:solidFill>
                 <a:latin typeface="Cambria" panose="02040503050406030204" pitchFamily="18" charset="0"/>
               </a:rPr>
-              <a:t>HIGHLIGHT CHALLENGES AND OPPORTUNITIES</a:t>
+              <a:t>REINFORCEMENT LEARNING</a:t>
             </a:r>
             <a:br>
               <a:rPr lang="en-US" sz="2400" b="1" dirty="0">
@@ -3788,78 +3699,6 @@
           <a:chExt cx="0" cy="0"/>
         </a:xfrm>
       </p:grpSpPr>
-      <p:pic>
-        <p:nvPicPr>
-          <p:cNvPr id="2" name="Picture 1">
-            <a:extLst>
-              <a:ext uri="{FF2B5EF4-FFF2-40B4-BE49-F238E27FC236}">
-                <a16:creationId xmlns:a16="http://schemas.microsoft.com/office/drawing/2014/main" id="{DDBF3C39-AC02-1C43-B98F-2CD760BE0027}"/>
-              </a:ext>
-            </a:extLst>
-          </p:cNvPr>
-          <p:cNvPicPr>
-            <a:picLocks noChangeAspect="1"/>
-          </p:cNvPicPr>
-          <p:nvPr/>
-        </p:nvPicPr>
-        <p:blipFill>
-          <a:blip r:embed="rId3"/>
-          <a:stretch>
-            <a:fillRect/>
-          </a:stretch>
-        </p:blipFill>
-        <p:spPr>
-          <a:xfrm>
-            <a:off x="957942" y="1737743"/>
-            <a:ext cx="10563497" cy="2722334"/>
-          </a:xfrm>
-          <a:prstGeom prst="rect">
-            <a:avLst/>
-          </a:prstGeom>
-        </p:spPr>
-      </p:pic>
-    </p:spTree>
-    <p:extLst>
-      <p:ext uri="{BB962C8B-B14F-4D97-AF65-F5344CB8AC3E}">
-        <p14:creationId xmlns:p14="http://schemas.microsoft.com/office/powerpoint/2010/main" val="1412673654"/>
-      </p:ext>
-    </p:extLst>
-  </p:cSld>
-  <p:clrMapOvr>
-    <a:masterClrMapping/>
-  </p:clrMapOvr>
-  <mc:AlternateContent xmlns:mc="http://schemas.openxmlformats.org/markup-compatibility/2006" xmlns:p14="http://schemas.microsoft.com/office/powerpoint/2010/main">
-    <mc:Choice Requires="p14">
-      <p:transition spd="med" p14:dur="700">
-        <p:fade/>
-      </p:transition>
-    </mc:Choice>
-    <mc:Fallback xmlns="">
-      <p:transition spd="med">
-        <p:fade/>
-      </p:transition>
-    </mc:Fallback>
-  </mc:AlternateContent>
-</p:sld>
-</file>
-
-<file path=ppt/slides/slide4.xml><?xml version="1.0" encoding="utf-8"?>
-<p:sld xmlns:a="http://schemas.openxmlformats.org/drawingml/2006/main" xmlns:r="http://schemas.openxmlformats.org/officeDocument/2006/relationships" xmlns:p="http://schemas.openxmlformats.org/presentationml/2006/main">
-  <p:cSld>
-    <p:spTree>
-      <p:nvGrpSpPr>
-        <p:cNvPr id="1" name=""/>
-        <p:cNvGrpSpPr/>
-        <p:nvPr/>
-      </p:nvGrpSpPr>
-      <p:grpSpPr>
-        <a:xfrm>
-          <a:off x="0" y="0"/>
-          <a:ext cx="0" cy="0"/>
-          <a:chOff x="0" y="0"/>
-          <a:chExt cx="0" cy="0"/>
-        </a:xfrm>
-      </p:grpSpPr>
       <p:sp>
         <p:nvSpPr>
           <p:cNvPr id="3" name="TextBox 2">
@@ -3874,8 +3713,8 @@
         </p:nvSpPr>
         <p:spPr>
           <a:xfrm>
-            <a:off x="4206240" y="2534194"/>
-            <a:ext cx="4259499" cy="369332"/>
+            <a:off x="8008620" y="933994"/>
+            <a:ext cx="3783536" cy="923330"/>
           </a:xfrm>
           <a:prstGeom prst="rect">
             <a:avLst/>
@@ -3889,8 +3728,331 @@
           <a:lstStyle/>
           <a:p>
             <a:r>
+              <a:rPr lang="fr-FR" dirty="0">
+                <a:hlinkClick r:id="rId3"/>
+              </a:rPr>
+              <a:t>http://botpoet.com/vote/other/</a:t>
+            </a:r>
+            <a:endParaRPr lang="fr-FR" dirty="0"/>
+          </a:p>
+          <a:p>
+            <a:r>
+              <a:rPr lang="fr-FR" dirty="0">
+                <a:hlinkClick r:id="rId4"/>
+              </a:rPr>
+              <a:t>http://yes.thatcan.be/my/next/tweet/</a:t>
+            </a:r>
+            <a:endParaRPr lang="fr-FR" dirty="0"/>
+          </a:p>
+          <a:p>
+            <a:endParaRPr lang="fr-FR" dirty="0"/>
+          </a:p>
+        </p:txBody>
+      </p:sp>
+      <p:sp>
+        <p:nvSpPr>
+          <p:cNvPr id="2" name="TextBox 1">
+            <a:extLst>
+              <a:ext uri="{FF2B5EF4-FFF2-40B4-BE49-F238E27FC236}">
+                <a16:creationId xmlns:a16="http://schemas.microsoft.com/office/drawing/2014/main" id="{5353C620-4CC8-C749-8952-B5D306664577}"/>
+              </a:ext>
+            </a:extLst>
+          </p:cNvPr>
+          <p:cNvSpPr txBox="1"/>
+          <p:nvPr/>
+        </p:nvSpPr>
+        <p:spPr>
+          <a:xfrm>
+            <a:off x="3507288" y="3027402"/>
+            <a:ext cx="4277709" cy="369332"/>
+          </a:xfrm>
+          <a:prstGeom prst="rect">
+            <a:avLst/>
+          </a:prstGeom>
+          <a:noFill/>
+        </p:spPr>
+        <p:txBody>
+          <a:bodyPr wrap="none" rtlCol="0">
+            <a:spAutoFit/>
+          </a:bodyPr>
+          <a:lstStyle/>
+          <a:p>
+            <a:r>
               <a:rPr lang="fr-FR" dirty="0"/>
-              <a:t>TO BE CONTINUED ON JUPYTER NOTEBOOK</a:t>
+              <a:t>https://</a:t>
+            </a:r>
+            <a:r>
+              <a:rPr lang="fr-FR" dirty="0" err="1"/>
+              <a:t>teachablemachine.withgoogle.com</a:t>
+            </a:r>
+            <a:r>
+              <a:rPr lang="fr-FR" dirty="0"/>
+              <a:t>/</a:t>
+            </a:r>
+          </a:p>
+        </p:txBody>
+      </p:sp>
+      <p:sp>
+        <p:nvSpPr>
+          <p:cNvPr id="4" name="Rectangle 3">
+            <a:extLst>
+              <a:ext uri="{FF2B5EF4-FFF2-40B4-BE49-F238E27FC236}">
+                <a16:creationId xmlns:a16="http://schemas.microsoft.com/office/drawing/2014/main" id="{7561AB4D-829A-694C-86D4-106666073F40}"/>
+              </a:ext>
+            </a:extLst>
+          </p:cNvPr>
+          <p:cNvSpPr/>
+          <p:nvPr/>
+        </p:nvSpPr>
+        <p:spPr>
+          <a:xfrm>
+            <a:off x="3507288" y="3396734"/>
+            <a:ext cx="3501023" cy="369332"/>
+          </a:xfrm>
+          <a:prstGeom prst="rect">
+            <a:avLst/>
+          </a:prstGeom>
+        </p:spPr>
+        <p:txBody>
+          <a:bodyPr wrap="none">
+            <a:spAutoFit/>
+          </a:bodyPr>
+          <a:lstStyle/>
+          <a:p>
+            <a:r>
+              <a:rPr lang="fr-FR" dirty="0"/>
+              <a:t>https://</a:t>
+            </a:r>
+            <a:r>
+              <a:rPr lang="fr-FR" dirty="0" err="1"/>
+              <a:t>quickdraw.withgoogle.com</a:t>
+            </a:r>
+            <a:r>
+              <a:rPr lang="fr-FR" dirty="0"/>
+              <a:t>/</a:t>
+            </a:r>
+          </a:p>
+        </p:txBody>
+      </p:sp>
+      <p:sp>
+        <p:nvSpPr>
+          <p:cNvPr id="5" name="Rectangle 4">
+            <a:extLst>
+              <a:ext uri="{FF2B5EF4-FFF2-40B4-BE49-F238E27FC236}">
+                <a16:creationId xmlns:a16="http://schemas.microsoft.com/office/drawing/2014/main" id="{9BC50EFF-23F7-A94F-883F-E346A37A6BD1}"/>
+              </a:ext>
+            </a:extLst>
+          </p:cNvPr>
+          <p:cNvSpPr/>
+          <p:nvPr/>
+        </p:nvSpPr>
+        <p:spPr>
+          <a:xfrm>
+            <a:off x="3507288" y="2628730"/>
+            <a:ext cx="4870949" cy="369332"/>
+          </a:xfrm>
+          <a:prstGeom prst="rect">
+            <a:avLst/>
+          </a:prstGeom>
+        </p:spPr>
+        <p:txBody>
+          <a:bodyPr wrap="none">
+            <a:spAutoFit/>
+          </a:bodyPr>
+          <a:lstStyle/>
+          <a:p>
+            <a:r>
+              <a:rPr lang="fr-FR" dirty="0"/>
+              <a:t>https://</a:t>
+            </a:r>
+            <a:r>
+              <a:rPr lang="fr-FR" dirty="0" err="1"/>
+              <a:t>experiments.withgoogle.com</a:t>
+            </a:r>
+            <a:r>
+              <a:rPr lang="fr-FR" dirty="0"/>
+              <a:t>/collection/ai</a:t>
+            </a:r>
+          </a:p>
+        </p:txBody>
+      </p:sp>
+      <p:sp>
+        <p:nvSpPr>
+          <p:cNvPr id="6" name="Rectangle 5">
+            <a:extLst>
+              <a:ext uri="{FF2B5EF4-FFF2-40B4-BE49-F238E27FC236}">
+                <a16:creationId xmlns:a16="http://schemas.microsoft.com/office/drawing/2014/main" id="{4D579049-868E-0A4C-B015-84F5C4BAD38B}"/>
+              </a:ext>
+            </a:extLst>
+          </p:cNvPr>
+          <p:cNvSpPr/>
+          <p:nvPr/>
+        </p:nvSpPr>
+        <p:spPr>
+          <a:xfrm>
+            <a:off x="3507288" y="4417338"/>
+            <a:ext cx="4727448" cy="369332"/>
+          </a:xfrm>
+          <a:prstGeom prst="rect">
+            <a:avLst/>
+          </a:prstGeom>
+        </p:spPr>
+        <p:txBody>
+          <a:bodyPr wrap="none">
+            <a:spAutoFit/>
+          </a:bodyPr>
+          <a:lstStyle/>
+          <a:p>
+            <a:r>
+              <a:rPr lang="fr-FR" dirty="0"/>
+              <a:t>https://</a:t>
+            </a:r>
+            <a:r>
+              <a:rPr lang="fr-FR" dirty="0" err="1"/>
+              <a:t>aidemos.microsoft.com</a:t>
+            </a:r>
+            <a:r>
+              <a:rPr lang="fr-FR" dirty="0"/>
+              <a:t>/face-recognition</a:t>
+            </a:r>
+          </a:p>
+        </p:txBody>
+      </p:sp>
+      <p:sp>
+        <p:nvSpPr>
+          <p:cNvPr id="7" name="Rectangle 6">
+            <a:extLst>
+              <a:ext uri="{FF2B5EF4-FFF2-40B4-BE49-F238E27FC236}">
+                <a16:creationId xmlns:a16="http://schemas.microsoft.com/office/drawing/2014/main" id="{74DD04B3-B8F2-E64C-B5B6-85839F411741}"/>
+              </a:ext>
+            </a:extLst>
+          </p:cNvPr>
+          <p:cNvSpPr/>
+          <p:nvPr/>
+        </p:nvSpPr>
+        <p:spPr>
+          <a:xfrm>
+            <a:off x="3507288" y="4135398"/>
+            <a:ext cx="3199594" cy="369332"/>
+          </a:xfrm>
+          <a:prstGeom prst="rect">
+            <a:avLst/>
+          </a:prstGeom>
+        </p:spPr>
+        <p:txBody>
+          <a:bodyPr wrap="none">
+            <a:spAutoFit/>
+          </a:bodyPr>
+          <a:lstStyle/>
+          <a:p>
+            <a:r>
+              <a:rPr lang="fr-FR" dirty="0"/>
+              <a:t>https://</a:t>
+            </a:r>
+            <a:r>
+              <a:rPr lang="fr-FR" dirty="0" err="1"/>
+              <a:t>aidemos.microsoft.com</a:t>
+            </a:r>
+            <a:r>
+              <a:rPr lang="fr-FR" dirty="0"/>
+              <a:t>/</a:t>
+            </a:r>
+          </a:p>
+        </p:txBody>
+      </p:sp>
+      <p:sp>
+        <p:nvSpPr>
+          <p:cNvPr id="8" name="Rectangle 7">
+            <a:extLst>
+              <a:ext uri="{FF2B5EF4-FFF2-40B4-BE49-F238E27FC236}">
+                <a16:creationId xmlns:a16="http://schemas.microsoft.com/office/drawing/2014/main" id="{AA3D2EFD-0198-594A-A34E-B66123E9EC98}"/>
+              </a:ext>
+            </a:extLst>
+          </p:cNvPr>
+          <p:cNvSpPr/>
+          <p:nvPr/>
+        </p:nvSpPr>
+        <p:spPr>
+          <a:xfrm>
+            <a:off x="3507288" y="4883944"/>
+            <a:ext cx="2620141" cy="369332"/>
+          </a:xfrm>
+          <a:prstGeom prst="rect">
+            <a:avLst/>
+          </a:prstGeom>
+        </p:spPr>
+        <p:txBody>
+          <a:bodyPr wrap="none">
+            <a:spAutoFit/>
+          </a:bodyPr>
+          <a:lstStyle/>
+          <a:p>
+            <a:r>
+              <a:rPr lang="fr-FR" dirty="0"/>
+              <a:t>https://</a:t>
+            </a:r>
+            <a:r>
+              <a:rPr lang="fr-FR" dirty="0" err="1"/>
+              <a:t>clarifai.com</a:t>
+            </a:r>
+            <a:r>
+              <a:rPr lang="fr-FR" dirty="0"/>
+              <a:t>/</a:t>
+            </a:r>
+            <a:r>
+              <a:rPr lang="fr-FR" dirty="0" err="1"/>
+              <a:t>demo</a:t>
+            </a:r>
+            <a:endParaRPr lang="fr-FR" dirty="0"/>
+          </a:p>
+        </p:txBody>
+      </p:sp>
+      <p:sp>
+        <p:nvSpPr>
+          <p:cNvPr id="9" name="Rectangle 8">
+            <a:extLst>
+              <a:ext uri="{FF2B5EF4-FFF2-40B4-BE49-F238E27FC236}">
+                <a16:creationId xmlns:a16="http://schemas.microsoft.com/office/drawing/2014/main" id="{3D96EA6E-7C78-8B42-AA1C-6647FF83927C}"/>
+              </a:ext>
+            </a:extLst>
+          </p:cNvPr>
+          <p:cNvSpPr/>
+          <p:nvPr/>
+        </p:nvSpPr>
+        <p:spPr>
+          <a:xfrm>
+            <a:off x="3554416" y="5535548"/>
+            <a:ext cx="4633191" cy="369332"/>
+          </a:xfrm>
+          <a:prstGeom prst="rect">
+            <a:avLst/>
+          </a:prstGeom>
+        </p:spPr>
+        <p:txBody>
+          <a:bodyPr wrap="none">
+            <a:spAutoFit/>
+          </a:bodyPr>
+          <a:lstStyle/>
+          <a:p>
+            <a:r>
+              <a:rPr lang="fr-FR" dirty="0"/>
+              <a:t>https://</a:t>
+            </a:r>
+            <a:r>
+              <a:rPr lang="fr-FR" dirty="0" err="1"/>
+              <a:t>watson</a:t>
+            </a:r>
+            <a:r>
+              <a:rPr lang="fr-FR" dirty="0"/>
+              <a:t>-assistant-</a:t>
+            </a:r>
+            <a:r>
+              <a:rPr lang="fr-FR" dirty="0" err="1"/>
+              <a:t>demo.ng.bluemix.net</a:t>
+            </a:r>
+            <a:r>
+              <a:rPr lang="fr-FR" dirty="0"/>
+              <a:t>/</a:t>
             </a:r>
           </a:p>
         </p:txBody>
@@ -3898,7 +4060,7 @@
     </p:spTree>
     <p:extLst>
       <p:ext uri="{BB962C8B-B14F-4D97-AF65-F5344CB8AC3E}">
-        <p14:creationId xmlns:p14="http://schemas.microsoft.com/office/powerpoint/2010/main" val="3250219744"/>
+        <p14:creationId xmlns:p14="http://schemas.microsoft.com/office/powerpoint/2010/main" val="891496747"/>
       </p:ext>
     </p:extLst>
   </p:cSld>

</xml_diff>

<commit_message>
add demos ml in action
</commit_message>
<xml_diff>
--- a/presentations/session-10-machine-learning-in-action.pptx
+++ b/presentations/session-10-machine-learning-in-action.pptx
@@ -5,12 +5,19 @@
     <p:sldMasterId id="2147483648" r:id="rId1"/>
   </p:sldMasterIdLst>
   <p:notesMasterIdLst>
-    <p:notesMasterId r:id="rId5"/>
+    <p:notesMasterId r:id="rId12"/>
   </p:notesMasterIdLst>
   <p:sldIdLst>
     <p:sldId id="263" r:id="rId2"/>
     <p:sldId id="538" r:id="rId3"/>
-    <p:sldId id="544" r:id="rId4"/>
+    <p:sldId id="584" r:id="rId4"/>
+    <p:sldId id="572" r:id="rId5"/>
+    <p:sldId id="573" r:id="rId6"/>
+    <p:sldId id="574" r:id="rId7"/>
+    <p:sldId id="575" r:id="rId8"/>
+    <p:sldId id="576" r:id="rId9"/>
+    <p:sldId id="577" r:id="rId10"/>
+    <p:sldId id="585" r:id="rId11"/>
   </p:sldIdLst>
   <p:sldSz cx="12192000" cy="6858000"/>
   <p:notesSz cx="6797675" cy="9874250"/>
@@ -561,6 +568,94 @@
 </p:notes>
 </file>
 
+<file path=ppt/notesSlides/notesSlide10.xml><?xml version="1.0" encoding="utf-8"?>
+<p:notes xmlns:a="http://schemas.openxmlformats.org/drawingml/2006/main" xmlns:r="http://schemas.openxmlformats.org/officeDocument/2006/relationships" xmlns:p="http://schemas.openxmlformats.org/presentationml/2006/main">
+  <p:cSld>
+    <p:spTree>
+      <p:nvGrpSpPr>
+        <p:cNvPr id="1" name=""/>
+        <p:cNvGrpSpPr/>
+        <p:nvPr/>
+      </p:nvGrpSpPr>
+      <p:grpSpPr>
+        <a:xfrm>
+          <a:off x="0" y="0"/>
+          <a:ext cx="0" cy="0"/>
+          <a:chOff x="0" y="0"/>
+          <a:chExt cx="0" cy="0"/>
+        </a:xfrm>
+      </p:grpSpPr>
+      <p:sp>
+        <p:nvSpPr>
+          <p:cNvPr id="2" name="Slide Image Placeholder 1"/>
+          <p:cNvSpPr>
+            <a:spLocks noGrp="1" noRot="1" noChangeAspect="1"/>
+          </p:cNvSpPr>
+          <p:nvPr>
+            <p:ph type="sldImg"/>
+          </p:nvPr>
+        </p:nvSpPr>
+        <p:spPr/>
+      </p:sp>
+      <p:sp>
+        <p:nvSpPr>
+          <p:cNvPr id="3" name="Notes Placeholder 2"/>
+          <p:cNvSpPr>
+            <a:spLocks noGrp="1"/>
+          </p:cNvSpPr>
+          <p:nvPr>
+            <p:ph type="body" idx="1"/>
+          </p:nvPr>
+        </p:nvSpPr>
+        <p:spPr/>
+        <p:txBody>
+          <a:bodyPr/>
+          <a:lstStyle/>
+          <a:p>
+            <a:pPr marL="171450" indent="-171450">
+              <a:buFont typeface="Arial" panose="020B0604020202020204" pitchFamily="34" charset="0"/>
+              <a:buChar char="•"/>
+            </a:pPr>
+            <a:endParaRPr lang="en-US" dirty="0"/>
+          </a:p>
+        </p:txBody>
+      </p:sp>
+      <p:sp>
+        <p:nvSpPr>
+          <p:cNvPr id="4" name="Slide Number Placeholder 3"/>
+          <p:cNvSpPr>
+            <a:spLocks noGrp="1"/>
+          </p:cNvSpPr>
+          <p:nvPr>
+            <p:ph type="sldNum" sz="quarter" idx="10"/>
+          </p:nvPr>
+        </p:nvSpPr>
+        <p:spPr/>
+        <p:txBody>
+          <a:bodyPr/>
+          <a:lstStyle/>
+          <a:p>
+            <a:fld id="{2F6F93F9-6E01-423B-ABB3-8FB3B0651941}" type="slidenum">
+              <a:rPr lang="en-US" smtClean="0"/>
+              <a:t>10</a:t>
+            </a:fld>
+            <a:endParaRPr lang="en-US"/>
+          </a:p>
+        </p:txBody>
+      </p:sp>
+    </p:spTree>
+    <p:extLst>
+      <p:ext uri="{BB962C8B-B14F-4D97-AF65-F5344CB8AC3E}">
+        <p14:creationId xmlns:p14="http://schemas.microsoft.com/office/powerpoint/2010/main" val="3833631308"/>
+      </p:ext>
+    </p:extLst>
+  </p:cSld>
+  <p:clrMapOvr>
+    <a:masterClrMapping/>
+  </p:clrMapOvr>
+</p:notes>
+</file>
+
 <file path=ppt/notesSlides/notesSlide2.xml><?xml version="1.0" encoding="utf-8"?>
 <p:notes xmlns:a="http://schemas.openxmlformats.org/drawingml/2006/main" xmlns:r="http://schemas.openxmlformats.org/officeDocument/2006/relationships" xmlns:p="http://schemas.openxmlformats.org/presentationml/2006/main">
   <p:cSld>
@@ -723,7 +818,511 @@
     </p:spTree>
     <p:extLst>
       <p:ext uri="{BB962C8B-B14F-4D97-AF65-F5344CB8AC3E}">
-        <p14:creationId xmlns:p14="http://schemas.microsoft.com/office/powerpoint/2010/main" val="3802785815"/>
+        <p14:creationId xmlns:p14="http://schemas.microsoft.com/office/powerpoint/2010/main" val="309650477"/>
+      </p:ext>
+    </p:extLst>
+  </p:cSld>
+  <p:clrMapOvr>
+    <a:masterClrMapping/>
+  </p:clrMapOvr>
+</p:notes>
+</file>
+
+<file path=ppt/notesSlides/notesSlide4.xml><?xml version="1.0" encoding="utf-8"?>
+<p:notes xmlns:a="http://schemas.openxmlformats.org/drawingml/2006/main" xmlns:r="http://schemas.openxmlformats.org/officeDocument/2006/relationships" xmlns:p="http://schemas.openxmlformats.org/presentationml/2006/main">
+  <p:cSld>
+    <p:spTree>
+      <p:nvGrpSpPr>
+        <p:cNvPr id="1" name=""/>
+        <p:cNvGrpSpPr/>
+        <p:nvPr/>
+      </p:nvGrpSpPr>
+      <p:grpSpPr>
+        <a:xfrm>
+          <a:off x="0" y="0"/>
+          <a:ext cx="0" cy="0"/>
+          <a:chOff x="0" y="0"/>
+          <a:chExt cx="0" cy="0"/>
+        </a:xfrm>
+      </p:grpSpPr>
+      <p:sp>
+        <p:nvSpPr>
+          <p:cNvPr id="2" name="Slide Image Placeholder 1"/>
+          <p:cNvSpPr>
+            <a:spLocks noGrp="1" noRot="1" noChangeAspect="1"/>
+          </p:cNvSpPr>
+          <p:nvPr>
+            <p:ph type="sldImg"/>
+          </p:nvPr>
+        </p:nvSpPr>
+        <p:spPr/>
+      </p:sp>
+      <p:sp>
+        <p:nvSpPr>
+          <p:cNvPr id="3" name="Notes Placeholder 2"/>
+          <p:cNvSpPr>
+            <a:spLocks noGrp="1"/>
+          </p:cNvSpPr>
+          <p:nvPr>
+            <p:ph type="body" idx="1"/>
+          </p:nvPr>
+        </p:nvSpPr>
+        <p:spPr/>
+        <p:txBody>
+          <a:bodyPr/>
+          <a:lstStyle/>
+          <a:p>
+            <a:endParaRPr lang="en-US" dirty="0"/>
+          </a:p>
+        </p:txBody>
+      </p:sp>
+      <p:sp>
+        <p:nvSpPr>
+          <p:cNvPr id="4" name="Slide Number Placeholder 3"/>
+          <p:cNvSpPr>
+            <a:spLocks noGrp="1"/>
+          </p:cNvSpPr>
+          <p:nvPr>
+            <p:ph type="sldNum" sz="quarter" idx="10"/>
+          </p:nvPr>
+        </p:nvSpPr>
+        <p:spPr/>
+        <p:txBody>
+          <a:bodyPr/>
+          <a:lstStyle/>
+          <a:p>
+            <a:fld id="{2F6F93F9-6E01-423B-ABB3-8FB3B0651941}" type="slidenum">
+              <a:rPr lang="en-US" smtClean="0"/>
+              <a:t>4</a:t>
+            </a:fld>
+            <a:endParaRPr lang="en-US"/>
+          </a:p>
+        </p:txBody>
+      </p:sp>
+    </p:spTree>
+    <p:extLst>
+      <p:ext uri="{BB962C8B-B14F-4D97-AF65-F5344CB8AC3E}">
+        <p14:creationId xmlns:p14="http://schemas.microsoft.com/office/powerpoint/2010/main" val="3618773216"/>
+      </p:ext>
+    </p:extLst>
+  </p:cSld>
+  <p:clrMapOvr>
+    <a:masterClrMapping/>
+  </p:clrMapOvr>
+</p:notes>
+</file>
+
+<file path=ppt/notesSlides/notesSlide5.xml><?xml version="1.0" encoding="utf-8"?>
+<p:notes xmlns:a="http://schemas.openxmlformats.org/drawingml/2006/main" xmlns:r="http://schemas.openxmlformats.org/officeDocument/2006/relationships" xmlns:p="http://schemas.openxmlformats.org/presentationml/2006/main">
+  <p:cSld>
+    <p:spTree>
+      <p:nvGrpSpPr>
+        <p:cNvPr id="1" name=""/>
+        <p:cNvGrpSpPr/>
+        <p:nvPr/>
+      </p:nvGrpSpPr>
+      <p:grpSpPr>
+        <a:xfrm>
+          <a:off x="0" y="0"/>
+          <a:ext cx="0" cy="0"/>
+          <a:chOff x="0" y="0"/>
+          <a:chExt cx="0" cy="0"/>
+        </a:xfrm>
+      </p:grpSpPr>
+      <p:sp>
+        <p:nvSpPr>
+          <p:cNvPr id="2" name="Slide Image Placeholder 1"/>
+          <p:cNvSpPr>
+            <a:spLocks noGrp="1" noRot="1" noChangeAspect="1"/>
+          </p:cNvSpPr>
+          <p:nvPr>
+            <p:ph type="sldImg"/>
+          </p:nvPr>
+        </p:nvSpPr>
+        <p:spPr/>
+      </p:sp>
+      <p:sp>
+        <p:nvSpPr>
+          <p:cNvPr id="3" name="Notes Placeholder 2"/>
+          <p:cNvSpPr>
+            <a:spLocks noGrp="1"/>
+          </p:cNvSpPr>
+          <p:nvPr>
+            <p:ph type="body" idx="1"/>
+          </p:nvPr>
+        </p:nvSpPr>
+        <p:spPr/>
+        <p:txBody>
+          <a:bodyPr/>
+          <a:lstStyle/>
+          <a:p>
+            <a:endParaRPr lang="en-US" dirty="0"/>
+          </a:p>
+        </p:txBody>
+      </p:sp>
+      <p:sp>
+        <p:nvSpPr>
+          <p:cNvPr id="4" name="Slide Number Placeholder 3"/>
+          <p:cNvSpPr>
+            <a:spLocks noGrp="1"/>
+          </p:cNvSpPr>
+          <p:nvPr>
+            <p:ph type="sldNum" sz="quarter" idx="10"/>
+          </p:nvPr>
+        </p:nvSpPr>
+        <p:spPr/>
+        <p:txBody>
+          <a:bodyPr/>
+          <a:lstStyle/>
+          <a:p>
+            <a:fld id="{2F6F93F9-6E01-423B-ABB3-8FB3B0651941}" type="slidenum">
+              <a:rPr lang="en-US" smtClean="0"/>
+              <a:t>5</a:t>
+            </a:fld>
+            <a:endParaRPr lang="en-US"/>
+          </a:p>
+        </p:txBody>
+      </p:sp>
+    </p:spTree>
+    <p:extLst>
+      <p:ext uri="{BB962C8B-B14F-4D97-AF65-F5344CB8AC3E}">
+        <p14:creationId xmlns:p14="http://schemas.microsoft.com/office/powerpoint/2010/main" val="1857969305"/>
+      </p:ext>
+    </p:extLst>
+  </p:cSld>
+  <p:clrMapOvr>
+    <a:masterClrMapping/>
+  </p:clrMapOvr>
+</p:notes>
+</file>
+
+<file path=ppt/notesSlides/notesSlide6.xml><?xml version="1.0" encoding="utf-8"?>
+<p:notes xmlns:a="http://schemas.openxmlformats.org/drawingml/2006/main" xmlns:r="http://schemas.openxmlformats.org/officeDocument/2006/relationships" xmlns:p="http://schemas.openxmlformats.org/presentationml/2006/main">
+  <p:cSld>
+    <p:spTree>
+      <p:nvGrpSpPr>
+        <p:cNvPr id="1" name=""/>
+        <p:cNvGrpSpPr/>
+        <p:nvPr/>
+      </p:nvGrpSpPr>
+      <p:grpSpPr>
+        <a:xfrm>
+          <a:off x="0" y="0"/>
+          <a:ext cx="0" cy="0"/>
+          <a:chOff x="0" y="0"/>
+          <a:chExt cx="0" cy="0"/>
+        </a:xfrm>
+      </p:grpSpPr>
+      <p:sp>
+        <p:nvSpPr>
+          <p:cNvPr id="2" name="Slide Image Placeholder 1"/>
+          <p:cNvSpPr>
+            <a:spLocks noGrp="1" noRot="1" noChangeAspect="1"/>
+          </p:cNvSpPr>
+          <p:nvPr>
+            <p:ph type="sldImg"/>
+          </p:nvPr>
+        </p:nvSpPr>
+        <p:spPr/>
+      </p:sp>
+      <p:sp>
+        <p:nvSpPr>
+          <p:cNvPr id="3" name="Notes Placeholder 2"/>
+          <p:cNvSpPr>
+            <a:spLocks noGrp="1"/>
+          </p:cNvSpPr>
+          <p:nvPr>
+            <p:ph type="body" idx="1"/>
+          </p:nvPr>
+        </p:nvSpPr>
+        <p:spPr/>
+        <p:txBody>
+          <a:bodyPr/>
+          <a:lstStyle/>
+          <a:p>
+            <a:endParaRPr lang="en-US" dirty="0"/>
+          </a:p>
+        </p:txBody>
+      </p:sp>
+      <p:sp>
+        <p:nvSpPr>
+          <p:cNvPr id="4" name="Slide Number Placeholder 3"/>
+          <p:cNvSpPr>
+            <a:spLocks noGrp="1"/>
+          </p:cNvSpPr>
+          <p:nvPr>
+            <p:ph type="sldNum" sz="quarter" idx="10"/>
+          </p:nvPr>
+        </p:nvSpPr>
+        <p:spPr/>
+        <p:txBody>
+          <a:bodyPr/>
+          <a:lstStyle/>
+          <a:p>
+            <a:fld id="{2F6F93F9-6E01-423B-ABB3-8FB3B0651941}" type="slidenum">
+              <a:rPr lang="en-US" smtClean="0"/>
+              <a:t>6</a:t>
+            </a:fld>
+            <a:endParaRPr lang="en-US"/>
+          </a:p>
+        </p:txBody>
+      </p:sp>
+    </p:spTree>
+    <p:extLst>
+      <p:ext uri="{BB962C8B-B14F-4D97-AF65-F5344CB8AC3E}">
+        <p14:creationId xmlns:p14="http://schemas.microsoft.com/office/powerpoint/2010/main" val="3167119447"/>
+      </p:ext>
+    </p:extLst>
+  </p:cSld>
+  <p:clrMapOvr>
+    <a:masterClrMapping/>
+  </p:clrMapOvr>
+</p:notes>
+</file>
+
+<file path=ppt/notesSlides/notesSlide7.xml><?xml version="1.0" encoding="utf-8"?>
+<p:notes xmlns:a="http://schemas.openxmlformats.org/drawingml/2006/main" xmlns:r="http://schemas.openxmlformats.org/officeDocument/2006/relationships" xmlns:p="http://schemas.openxmlformats.org/presentationml/2006/main">
+  <p:cSld>
+    <p:spTree>
+      <p:nvGrpSpPr>
+        <p:cNvPr id="1" name=""/>
+        <p:cNvGrpSpPr/>
+        <p:nvPr/>
+      </p:nvGrpSpPr>
+      <p:grpSpPr>
+        <a:xfrm>
+          <a:off x="0" y="0"/>
+          <a:ext cx="0" cy="0"/>
+          <a:chOff x="0" y="0"/>
+          <a:chExt cx="0" cy="0"/>
+        </a:xfrm>
+      </p:grpSpPr>
+      <p:sp>
+        <p:nvSpPr>
+          <p:cNvPr id="2" name="Slide Image Placeholder 1"/>
+          <p:cNvSpPr>
+            <a:spLocks noGrp="1" noRot="1" noChangeAspect="1"/>
+          </p:cNvSpPr>
+          <p:nvPr>
+            <p:ph type="sldImg"/>
+          </p:nvPr>
+        </p:nvSpPr>
+        <p:spPr/>
+      </p:sp>
+      <p:sp>
+        <p:nvSpPr>
+          <p:cNvPr id="3" name="Notes Placeholder 2"/>
+          <p:cNvSpPr>
+            <a:spLocks noGrp="1"/>
+          </p:cNvSpPr>
+          <p:nvPr>
+            <p:ph type="body" idx="1"/>
+          </p:nvPr>
+        </p:nvSpPr>
+        <p:spPr/>
+        <p:txBody>
+          <a:bodyPr/>
+          <a:lstStyle/>
+          <a:p>
+            <a:endParaRPr lang="en-US" dirty="0"/>
+          </a:p>
+        </p:txBody>
+      </p:sp>
+      <p:sp>
+        <p:nvSpPr>
+          <p:cNvPr id="4" name="Slide Number Placeholder 3"/>
+          <p:cNvSpPr>
+            <a:spLocks noGrp="1"/>
+          </p:cNvSpPr>
+          <p:nvPr>
+            <p:ph type="sldNum" sz="quarter" idx="10"/>
+          </p:nvPr>
+        </p:nvSpPr>
+        <p:spPr/>
+        <p:txBody>
+          <a:bodyPr/>
+          <a:lstStyle/>
+          <a:p>
+            <a:fld id="{2F6F93F9-6E01-423B-ABB3-8FB3B0651941}" type="slidenum">
+              <a:rPr lang="en-US" smtClean="0"/>
+              <a:t>7</a:t>
+            </a:fld>
+            <a:endParaRPr lang="en-US"/>
+          </a:p>
+        </p:txBody>
+      </p:sp>
+    </p:spTree>
+    <p:extLst>
+      <p:ext uri="{BB962C8B-B14F-4D97-AF65-F5344CB8AC3E}">
+        <p14:creationId xmlns:p14="http://schemas.microsoft.com/office/powerpoint/2010/main" val="206987495"/>
+      </p:ext>
+    </p:extLst>
+  </p:cSld>
+  <p:clrMapOvr>
+    <a:masterClrMapping/>
+  </p:clrMapOvr>
+</p:notes>
+</file>
+
+<file path=ppt/notesSlides/notesSlide8.xml><?xml version="1.0" encoding="utf-8"?>
+<p:notes xmlns:a="http://schemas.openxmlformats.org/drawingml/2006/main" xmlns:r="http://schemas.openxmlformats.org/officeDocument/2006/relationships" xmlns:p="http://schemas.openxmlformats.org/presentationml/2006/main">
+  <p:cSld>
+    <p:spTree>
+      <p:nvGrpSpPr>
+        <p:cNvPr id="1" name=""/>
+        <p:cNvGrpSpPr/>
+        <p:nvPr/>
+      </p:nvGrpSpPr>
+      <p:grpSpPr>
+        <a:xfrm>
+          <a:off x="0" y="0"/>
+          <a:ext cx="0" cy="0"/>
+          <a:chOff x="0" y="0"/>
+          <a:chExt cx="0" cy="0"/>
+        </a:xfrm>
+      </p:grpSpPr>
+      <p:sp>
+        <p:nvSpPr>
+          <p:cNvPr id="2" name="Slide Image Placeholder 1"/>
+          <p:cNvSpPr>
+            <a:spLocks noGrp="1" noRot="1" noChangeAspect="1"/>
+          </p:cNvSpPr>
+          <p:nvPr>
+            <p:ph type="sldImg"/>
+          </p:nvPr>
+        </p:nvSpPr>
+        <p:spPr/>
+      </p:sp>
+      <p:sp>
+        <p:nvSpPr>
+          <p:cNvPr id="3" name="Notes Placeholder 2"/>
+          <p:cNvSpPr>
+            <a:spLocks noGrp="1"/>
+          </p:cNvSpPr>
+          <p:nvPr>
+            <p:ph type="body" idx="1"/>
+          </p:nvPr>
+        </p:nvSpPr>
+        <p:spPr/>
+        <p:txBody>
+          <a:bodyPr/>
+          <a:lstStyle/>
+          <a:p>
+            <a:endParaRPr lang="en-US" dirty="0"/>
+          </a:p>
+        </p:txBody>
+      </p:sp>
+      <p:sp>
+        <p:nvSpPr>
+          <p:cNvPr id="4" name="Slide Number Placeholder 3"/>
+          <p:cNvSpPr>
+            <a:spLocks noGrp="1"/>
+          </p:cNvSpPr>
+          <p:nvPr>
+            <p:ph type="sldNum" sz="quarter" idx="10"/>
+          </p:nvPr>
+        </p:nvSpPr>
+        <p:spPr/>
+        <p:txBody>
+          <a:bodyPr/>
+          <a:lstStyle/>
+          <a:p>
+            <a:fld id="{2F6F93F9-6E01-423B-ABB3-8FB3B0651941}" type="slidenum">
+              <a:rPr lang="en-US" smtClean="0"/>
+              <a:t>8</a:t>
+            </a:fld>
+            <a:endParaRPr lang="en-US"/>
+          </a:p>
+        </p:txBody>
+      </p:sp>
+    </p:spTree>
+    <p:extLst>
+      <p:ext uri="{BB962C8B-B14F-4D97-AF65-F5344CB8AC3E}">
+        <p14:creationId xmlns:p14="http://schemas.microsoft.com/office/powerpoint/2010/main" val="1147908284"/>
+      </p:ext>
+    </p:extLst>
+  </p:cSld>
+  <p:clrMapOvr>
+    <a:masterClrMapping/>
+  </p:clrMapOvr>
+</p:notes>
+</file>
+
+<file path=ppt/notesSlides/notesSlide9.xml><?xml version="1.0" encoding="utf-8"?>
+<p:notes xmlns:a="http://schemas.openxmlformats.org/drawingml/2006/main" xmlns:r="http://schemas.openxmlformats.org/officeDocument/2006/relationships" xmlns:p="http://schemas.openxmlformats.org/presentationml/2006/main">
+  <p:cSld>
+    <p:spTree>
+      <p:nvGrpSpPr>
+        <p:cNvPr id="1" name=""/>
+        <p:cNvGrpSpPr/>
+        <p:nvPr/>
+      </p:nvGrpSpPr>
+      <p:grpSpPr>
+        <a:xfrm>
+          <a:off x="0" y="0"/>
+          <a:ext cx="0" cy="0"/>
+          <a:chOff x="0" y="0"/>
+          <a:chExt cx="0" cy="0"/>
+        </a:xfrm>
+      </p:grpSpPr>
+      <p:sp>
+        <p:nvSpPr>
+          <p:cNvPr id="2" name="Slide Image Placeholder 1"/>
+          <p:cNvSpPr>
+            <a:spLocks noGrp="1" noRot="1" noChangeAspect="1"/>
+          </p:cNvSpPr>
+          <p:nvPr>
+            <p:ph type="sldImg"/>
+          </p:nvPr>
+        </p:nvSpPr>
+        <p:spPr/>
+      </p:sp>
+      <p:sp>
+        <p:nvSpPr>
+          <p:cNvPr id="3" name="Notes Placeholder 2"/>
+          <p:cNvSpPr>
+            <a:spLocks noGrp="1"/>
+          </p:cNvSpPr>
+          <p:nvPr>
+            <p:ph type="body" idx="1"/>
+          </p:nvPr>
+        </p:nvSpPr>
+        <p:spPr/>
+        <p:txBody>
+          <a:bodyPr/>
+          <a:lstStyle/>
+          <a:p>
+            <a:endParaRPr lang="en-US" dirty="0"/>
+          </a:p>
+        </p:txBody>
+      </p:sp>
+      <p:sp>
+        <p:nvSpPr>
+          <p:cNvPr id="4" name="Slide Number Placeholder 3"/>
+          <p:cNvSpPr>
+            <a:spLocks noGrp="1"/>
+          </p:cNvSpPr>
+          <p:nvPr>
+            <p:ph type="sldNum" sz="quarter" idx="10"/>
+          </p:nvPr>
+        </p:nvSpPr>
+        <p:spPr/>
+        <p:txBody>
+          <a:bodyPr/>
+          <a:lstStyle/>
+          <a:p>
+            <a:fld id="{2F6F93F9-6E01-423B-ABB3-8FB3B0651941}" type="slidenum">
+              <a:rPr lang="en-US" smtClean="0"/>
+              <a:t>9</a:t>
+            </a:fld>
+            <a:endParaRPr lang="en-US"/>
+          </a:p>
+        </p:txBody>
+      </p:sp>
+    </p:spTree>
+    <p:extLst>
+      <p:ext uri="{BB962C8B-B14F-4D97-AF65-F5344CB8AC3E}">
+        <p14:creationId xmlns:p14="http://schemas.microsoft.com/office/powerpoint/2010/main" val="2265900671"/>
       </p:ext>
     </p:extLst>
   </p:cSld>
@@ -3478,6 +4077,121 @@
 </p:sld>
 </file>
 
+<file path=ppt/slides/slide10.xml><?xml version="1.0" encoding="utf-8"?>
+<p:sld xmlns:a="http://schemas.openxmlformats.org/drawingml/2006/main" xmlns:r="http://schemas.openxmlformats.org/officeDocument/2006/relationships" xmlns:p="http://schemas.openxmlformats.org/presentationml/2006/main">
+  <p:cSld>
+    <p:spTree>
+      <p:nvGrpSpPr>
+        <p:cNvPr id="1" name=""/>
+        <p:cNvGrpSpPr/>
+        <p:nvPr/>
+      </p:nvGrpSpPr>
+      <p:grpSpPr>
+        <a:xfrm>
+          <a:off x="0" y="0"/>
+          <a:ext cx="0" cy="0"/>
+          <a:chOff x="0" y="0"/>
+          <a:chExt cx="0" cy="0"/>
+        </a:xfrm>
+      </p:grpSpPr>
+      <p:sp>
+        <p:nvSpPr>
+          <p:cNvPr id="3" name="TextBox 2"/>
+          <p:cNvSpPr txBox="1"/>
+          <p:nvPr/>
+        </p:nvSpPr>
+        <p:spPr>
+          <a:xfrm>
+            <a:off x="2513338" y="1738043"/>
+            <a:ext cx="8924282" cy="861774"/>
+          </a:xfrm>
+          <a:prstGeom prst="rect">
+            <a:avLst/>
+          </a:prstGeom>
+          <a:noFill/>
+        </p:spPr>
+        <p:txBody>
+          <a:bodyPr wrap="square" rtlCol="0">
+            <a:spAutoFit/>
+          </a:bodyPr>
+          <a:lstStyle/>
+          <a:p>
+            <a:r>
+              <a:rPr lang="en-US" sz="5000" b="1" dirty="0">
+                <a:solidFill>
+                  <a:schemeClr val="accent1"/>
+                </a:solidFill>
+                <a:latin typeface="Cambria" panose="02040503050406030204" pitchFamily="18" charset="0"/>
+              </a:rPr>
+              <a:t>NUTS AND BOLTS OF DL</a:t>
+            </a:r>
+          </a:p>
+        </p:txBody>
+      </p:sp>
+      <p:cxnSp>
+        <p:nvCxnSpPr>
+          <p:cNvPr id="5" name="Straight Connector 4">
+            <a:extLst>
+              <a:ext uri="{FF2B5EF4-FFF2-40B4-BE49-F238E27FC236}">
+                <a16:creationId xmlns:a16="http://schemas.microsoft.com/office/drawing/2014/main" id="{2571E43F-CCA3-BB47-A7AF-81B47EA888E0}"/>
+              </a:ext>
+            </a:extLst>
+          </p:cNvPr>
+          <p:cNvCxnSpPr>
+            <a:cxnSpLocks/>
+          </p:cNvCxnSpPr>
+          <p:nvPr/>
+        </p:nvCxnSpPr>
+        <p:spPr>
+          <a:xfrm>
+            <a:off x="2300750" y="1879133"/>
+            <a:ext cx="0" cy="650707"/>
+          </a:xfrm>
+          <a:prstGeom prst="line">
+            <a:avLst/>
+          </a:prstGeom>
+          <a:ln w="38100"/>
+        </p:spPr>
+        <p:style>
+          <a:lnRef idx="1">
+            <a:schemeClr val="accent1"/>
+          </a:lnRef>
+          <a:fillRef idx="0">
+            <a:schemeClr val="accent1"/>
+          </a:fillRef>
+          <a:effectRef idx="0">
+            <a:schemeClr val="accent1"/>
+          </a:effectRef>
+          <a:fontRef idx="minor">
+            <a:schemeClr val="tx1"/>
+          </a:fontRef>
+        </p:style>
+      </p:cxnSp>
+    </p:spTree>
+    <p:extLst>
+      <p:ext uri="{BB962C8B-B14F-4D97-AF65-F5344CB8AC3E}">
+        <p14:creationId xmlns:p14="http://schemas.microsoft.com/office/powerpoint/2010/main" val="3861190064"/>
+      </p:ext>
+    </p:extLst>
+  </p:cSld>
+  <p:clrMapOvr>
+    <a:masterClrMapping/>
+  </p:clrMapOvr>
+  <mc:AlternateContent xmlns:mc="http://schemas.openxmlformats.org/markup-compatibility/2006" xmlns:p14="http://schemas.microsoft.com/office/powerpoint/2010/main">
+    <mc:Choice Requires="p14">
+      <p:transition spd="med" p14:dur="700">
+        <p:fade/>
+      </p:transition>
+    </mc:Choice>
+    <mc:Fallback xmlns="">
+      <p:transition spd="med">
+        <p:fade/>
+      </p:transition>
+    </mc:Fallback>
+  </mc:AlternateContent>
+</p:sld>
+</file>
+
 <file path=ppt/slides/slide2.xml><?xml version="1.0" encoding="utf-8"?>
 <p:sld xmlns:a="http://schemas.openxmlformats.org/drawingml/2006/main" xmlns:r="http://schemas.openxmlformats.org/officeDocument/2006/relationships" xmlns:p="http://schemas.openxmlformats.org/presentationml/2006/main">
   <p:cSld>
@@ -3568,7 +4282,7 @@
                 </a:solidFill>
                 <a:latin typeface="Cambria" panose="02040503050406030204" pitchFamily="18" charset="0"/>
               </a:rPr>
-              <a:t>SURVEY OF ONLINE DEMO OF DEEP LEARNING IN THE FIELD OF IMAGE RECOGNITION, GENERATIVE NN, ASSISTANTS, …</a:t>
+              <a:t>SURVEY OF ONLINE DEMO OF DEEP LEARNING IN THE FIELD OF IMAGE RECOGNITION, GENERATIVE DEEP LEARNING, …</a:t>
             </a:r>
             <a:br>
               <a:rPr lang="en-US" sz="2400" b="1" dirty="0">
@@ -3701,20 +4415,14 @@
       </p:grpSpPr>
       <p:sp>
         <p:nvSpPr>
-          <p:cNvPr id="3" name="TextBox 2">
-            <a:extLst>
-              <a:ext uri="{FF2B5EF4-FFF2-40B4-BE49-F238E27FC236}">
-                <a16:creationId xmlns:a16="http://schemas.microsoft.com/office/drawing/2014/main" id="{D81ED56E-B6B4-F540-8100-D85896709773}"/>
-              </a:ext>
-            </a:extLst>
-          </p:cNvPr>
+          <p:cNvPr id="3" name="TextBox 2"/>
           <p:cNvSpPr txBox="1"/>
           <p:nvPr/>
         </p:nvSpPr>
         <p:spPr>
           <a:xfrm>
-            <a:off x="8008620" y="933994"/>
-            <a:ext cx="3783536" cy="923330"/>
+            <a:off x="2513338" y="1738043"/>
+            <a:ext cx="8924282" cy="861774"/>
           </a:xfrm>
           <a:prstGeom prst="rect">
             <a:avLst/>
@@ -3722,49 +4430,114 @@
           <a:noFill/>
         </p:spPr>
         <p:txBody>
-          <a:bodyPr wrap="none" rtlCol="0">
+          <a:bodyPr wrap="square" rtlCol="0">
             <a:spAutoFit/>
           </a:bodyPr>
           <a:lstStyle/>
           <a:p>
             <a:r>
-              <a:rPr lang="fr-FR" dirty="0">
-                <a:hlinkClick r:id="rId3"/>
+              <a:rPr lang="en-US" sz="5000" b="1" dirty="0">
+                <a:solidFill>
+                  <a:schemeClr val="accent1"/>
+                </a:solidFill>
+                <a:latin typeface="Cambria" panose="02040503050406030204" pitchFamily="18" charset="0"/>
               </a:rPr>
-              <a:t>http://botpoet.com/vote/other/</a:t>
-            </a:r>
-            <a:endParaRPr lang="fr-FR" dirty="0"/>
-          </a:p>
-          <a:p>
-            <a:r>
-              <a:rPr lang="fr-FR" dirty="0">
-                <a:hlinkClick r:id="rId4"/>
-              </a:rPr>
-              <a:t>http://yes.thatcan.be/my/next/tweet/</a:t>
-            </a:r>
-            <a:endParaRPr lang="fr-FR" dirty="0"/>
-          </a:p>
-          <a:p>
-            <a:endParaRPr lang="fr-FR" dirty="0"/>
-          </a:p>
-        </p:txBody>
-      </p:sp>
-      <p:sp>
-        <p:nvSpPr>
-          <p:cNvPr id="2" name="TextBox 1">
+              <a:t>EXPERIMENT AI ONLINE</a:t>
+            </a:r>
+          </a:p>
+        </p:txBody>
+      </p:sp>
+      <p:cxnSp>
+        <p:nvCxnSpPr>
+          <p:cNvPr id="5" name="Straight Connector 4">
             <a:extLst>
               <a:ext uri="{FF2B5EF4-FFF2-40B4-BE49-F238E27FC236}">
-                <a16:creationId xmlns:a16="http://schemas.microsoft.com/office/drawing/2014/main" id="{5353C620-4CC8-C749-8952-B5D306664577}"/>
+                <a16:creationId xmlns:a16="http://schemas.microsoft.com/office/drawing/2014/main" id="{2571E43F-CCA3-BB47-A7AF-81B47EA888E0}"/>
               </a:ext>
             </a:extLst>
           </p:cNvPr>
+          <p:cNvCxnSpPr>
+            <a:cxnSpLocks/>
+          </p:cNvCxnSpPr>
+          <p:nvPr/>
+        </p:nvCxnSpPr>
+        <p:spPr>
+          <a:xfrm>
+            <a:off x="2300750" y="1879133"/>
+            <a:ext cx="0" cy="650707"/>
+          </a:xfrm>
+          <a:prstGeom prst="line">
+            <a:avLst/>
+          </a:prstGeom>
+          <a:ln w="38100"/>
+        </p:spPr>
+        <p:style>
+          <a:lnRef idx="1">
+            <a:schemeClr val="accent1"/>
+          </a:lnRef>
+          <a:fillRef idx="0">
+            <a:schemeClr val="accent1"/>
+          </a:fillRef>
+          <a:effectRef idx="0">
+            <a:schemeClr val="accent1"/>
+          </a:effectRef>
+          <a:fontRef idx="minor">
+            <a:schemeClr val="tx1"/>
+          </a:fontRef>
+        </p:style>
+      </p:cxnSp>
+    </p:spTree>
+    <p:extLst>
+      <p:ext uri="{BB962C8B-B14F-4D97-AF65-F5344CB8AC3E}">
+        <p14:creationId xmlns:p14="http://schemas.microsoft.com/office/powerpoint/2010/main" val="3361219441"/>
+      </p:ext>
+    </p:extLst>
+  </p:cSld>
+  <p:clrMapOvr>
+    <a:masterClrMapping/>
+  </p:clrMapOvr>
+  <mc:AlternateContent xmlns:mc="http://schemas.openxmlformats.org/markup-compatibility/2006" xmlns:p14="http://schemas.microsoft.com/office/powerpoint/2010/main">
+    <mc:Choice Requires="p14">
+      <p:transition spd="med" p14:dur="700">
+        <p:fade/>
+      </p:transition>
+    </mc:Choice>
+    <mc:Fallback xmlns="">
+      <p:transition spd="med">
+        <p:fade/>
+      </p:transition>
+    </mc:Fallback>
+  </mc:AlternateContent>
+</p:sld>
+</file>
+
+<file path=ppt/slides/slide4.xml><?xml version="1.0" encoding="utf-8"?>
+<p:sld xmlns:a="http://schemas.openxmlformats.org/drawingml/2006/main" xmlns:r="http://schemas.openxmlformats.org/officeDocument/2006/relationships" xmlns:p="http://schemas.openxmlformats.org/presentationml/2006/main">
+  <p:cSld>
+    <p:spTree>
+      <p:nvGrpSpPr>
+        <p:cNvPr id="1" name=""/>
+        <p:cNvGrpSpPr/>
+        <p:nvPr/>
+      </p:nvGrpSpPr>
+      <p:grpSpPr>
+        <a:xfrm>
+          <a:off x="0" y="0"/>
+          <a:ext cx="0" cy="0"/>
+          <a:chOff x="0" y="0"/>
+          <a:chExt cx="0" cy="0"/>
+        </a:xfrm>
+      </p:grpSpPr>
+      <p:sp>
+        <p:nvSpPr>
+          <p:cNvPr id="8" name="TextBox 7"/>
           <p:cNvSpPr txBox="1"/>
           <p:nvPr/>
         </p:nvSpPr>
         <p:spPr>
           <a:xfrm>
-            <a:off x="3507288" y="3027402"/>
-            <a:ext cx="4277709" cy="369332"/>
+            <a:off x="1271768" y="1115051"/>
+            <a:ext cx="9196386" cy="553998"/>
           </a:xfrm>
           <a:prstGeom prst="rect">
             <a:avLst/>
@@ -3772,32 +4545,98 @@
           <a:noFill/>
         </p:spPr>
         <p:txBody>
-          <a:bodyPr wrap="none" rtlCol="0">
+          <a:bodyPr wrap="square" rtlCol="0">
             <a:spAutoFit/>
           </a:bodyPr>
           <a:lstStyle/>
           <a:p>
             <a:r>
-              <a:rPr lang="fr-FR" dirty="0"/>
-              <a:t>https://</a:t>
-            </a:r>
-            <a:r>
-              <a:rPr lang="fr-FR" dirty="0" err="1"/>
-              <a:t>teachablemachine.withgoogle.com</a:t>
-            </a:r>
-            <a:r>
-              <a:rPr lang="fr-FR" dirty="0"/>
-              <a:t>/</a:t>
-            </a:r>
-          </a:p>
-        </p:txBody>
-      </p:sp>
-      <p:sp>
-        <p:nvSpPr>
-          <p:cNvPr id="4" name="Rectangle 3">
+              <a:rPr lang="en-US" sz="3000" b="1" dirty="0">
+                <a:solidFill>
+                  <a:schemeClr val="accent1"/>
+                </a:solidFill>
+                <a:latin typeface="Cambria" panose="02040503050406030204" pitchFamily="18" charset="0"/>
+              </a:rPr>
+              <a:t>EXPERIMENTS WITH AI</a:t>
+            </a:r>
+          </a:p>
+        </p:txBody>
+      </p:sp>
+      <p:cxnSp>
+        <p:nvCxnSpPr>
+          <p:cNvPr id="5" name="Straight Connector 4">
             <a:extLst>
               <a:ext uri="{FF2B5EF4-FFF2-40B4-BE49-F238E27FC236}">
-                <a16:creationId xmlns:a16="http://schemas.microsoft.com/office/drawing/2014/main" id="{7561AB4D-829A-694C-86D4-106666073F40}"/>
+                <a16:creationId xmlns:a16="http://schemas.microsoft.com/office/drawing/2014/main" id="{42A41E69-7588-1141-85AB-3E64FCF88D3D}"/>
+              </a:ext>
+            </a:extLst>
+          </p:cNvPr>
+          <p:cNvCxnSpPr>
+            <a:cxnSpLocks/>
+          </p:cNvCxnSpPr>
+          <p:nvPr/>
+        </p:nvCxnSpPr>
+        <p:spPr>
+          <a:xfrm>
+            <a:off x="1378101" y="1753299"/>
+            <a:ext cx="9823299" cy="0"/>
+          </a:xfrm>
+          <a:prstGeom prst="line">
+            <a:avLst/>
+          </a:prstGeom>
+          <a:ln w="12700"/>
+        </p:spPr>
+        <p:style>
+          <a:lnRef idx="1">
+            <a:schemeClr val="accent1"/>
+          </a:lnRef>
+          <a:fillRef idx="0">
+            <a:schemeClr val="accent1"/>
+          </a:fillRef>
+          <a:effectRef idx="0">
+            <a:schemeClr val="accent1"/>
+          </a:effectRef>
+          <a:fontRef idx="minor">
+            <a:schemeClr val="tx1"/>
+          </a:fontRef>
+        </p:style>
+      </p:cxnSp>
+      <p:pic>
+        <p:nvPicPr>
+          <p:cNvPr id="3" name="Picture 2">
+            <a:extLst>
+              <a:ext uri="{FF2B5EF4-FFF2-40B4-BE49-F238E27FC236}">
+                <a16:creationId xmlns:a16="http://schemas.microsoft.com/office/drawing/2014/main" id="{84A39BE9-9259-724A-9F98-2EE808BBBB4C}"/>
+              </a:ext>
+            </a:extLst>
+          </p:cNvPr>
+          <p:cNvPicPr>
+            <a:picLocks noChangeAspect="1"/>
+          </p:cNvPicPr>
+          <p:nvPr/>
+        </p:nvPicPr>
+        <p:blipFill>
+          <a:blip r:embed="rId3"/>
+          <a:stretch>
+            <a:fillRect/>
+          </a:stretch>
+        </p:blipFill>
+        <p:spPr>
+          <a:xfrm>
+            <a:off x="1378101" y="1933968"/>
+            <a:ext cx="4754323" cy="4069239"/>
+          </a:xfrm>
+          <a:prstGeom prst="rect">
+            <a:avLst/>
+          </a:prstGeom>
+        </p:spPr>
+      </p:pic>
+      <p:sp>
+        <p:nvSpPr>
+          <p:cNvPr id="9" name="Rectangle 8">
+            <a:extLst>
+              <a:ext uri="{FF2B5EF4-FFF2-40B4-BE49-F238E27FC236}">
+                <a16:creationId xmlns:a16="http://schemas.microsoft.com/office/drawing/2014/main" id="{5091DD16-C5AD-F649-A0C0-391AD084355F}"/>
               </a:ext>
             </a:extLst>
           </p:cNvPr>
@@ -3806,8 +4645,8 @@
         </p:nvSpPr>
         <p:spPr>
           <a:xfrm>
-            <a:off x="3507288" y="3396734"/>
-            <a:ext cx="3501023" cy="369332"/>
+            <a:off x="6334531" y="1860641"/>
+            <a:ext cx="4993290" cy="923330"/>
           </a:xfrm>
           <a:prstGeom prst="rect">
             <a:avLst/>
@@ -3820,26 +4659,46 @@
           <a:lstStyle/>
           <a:p>
             <a:r>
-              <a:rPr lang="fr-FR" dirty="0"/>
-              <a:t>https://</a:t>
-            </a:r>
-            <a:r>
-              <a:rPr lang="fr-FR" dirty="0" err="1"/>
-              <a:t>quickdraw.withgoogle.com</a:t>
-            </a:r>
-            <a:r>
-              <a:rPr lang="fr-FR" dirty="0"/>
-              <a:t>/</a:t>
-            </a:r>
-          </a:p>
-        </p:txBody>
-      </p:sp>
-      <p:sp>
-        <p:nvSpPr>
-          <p:cNvPr id="5" name="Rectangle 4">
+              <a:rPr lang="fr-FR" dirty="0">
+                <a:solidFill>
+                  <a:schemeClr val="accent1"/>
+                </a:solidFill>
+                <a:hlinkClick r:id="rId4"/>
+              </a:rPr>
+              <a:t>https://experiments.withgoogle.com/collection/ai</a:t>
+            </a:r>
+            <a:br>
+              <a:rPr lang="fr-FR" dirty="0">
+                <a:solidFill>
+                  <a:schemeClr val="accent1"/>
+                </a:solidFill>
+              </a:rPr>
+            </a:br>
+            <a:endParaRPr lang="fr-FR" dirty="0">
+              <a:solidFill>
+                <a:schemeClr val="accent1"/>
+              </a:solidFill>
+            </a:endParaRPr>
+          </a:p>
+          <a:p>
+            <a:pPr marL="342900" indent="-342900">
+              <a:buFont typeface="+mj-lt"/>
+              <a:buAutoNum type="arabicPeriod"/>
+            </a:pPr>
+            <a:endParaRPr lang="fr-FR" b="1" dirty="0">
+              <a:solidFill>
+                <a:schemeClr val="accent1"/>
+              </a:solidFill>
+            </a:endParaRPr>
+          </a:p>
+        </p:txBody>
+      </p:sp>
+      <p:sp>
+        <p:nvSpPr>
+          <p:cNvPr id="13" name="Rectangle 12">
             <a:extLst>
               <a:ext uri="{FF2B5EF4-FFF2-40B4-BE49-F238E27FC236}">
-                <a16:creationId xmlns:a16="http://schemas.microsoft.com/office/drawing/2014/main" id="{9BC50EFF-23F7-A94F-883F-E346A37A6BD1}"/>
+                <a16:creationId xmlns:a16="http://schemas.microsoft.com/office/drawing/2014/main" id="{0A583D42-A478-5D4F-AA3C-4CA0FB6ACC51}"/>
               </a:ext>
             </a:extLst>
           </p:cNvPr>
@@ -3848,40 +4707,68 @@
         </p:nvSpPr>
         <p:spPr>
           <a:xfrm>
-            <a:off x="3507288" y="2628730"/>
-            <a:ext cx="4870949" cy="369332"/>
+            <a:off x="6334531" y="2255726"/>
+            <a:ext cx="6096000" cy="646331"/>
           </a:xfrm>
           <a:prstGeom prst="rect">
             <a:avLst/>
           </a:prstGeom>
         </p:spPr>
         <p:txBody>
-          <a:bodyPr wrap="none">
+          <a:bodyPr>
             <a:spAutoFit/>
           </a:bodyPr>
           <a:lstStyle/>
           <a:p>
             <a:r>
-              <a:rPr lang="fr-FR" dirty="0"/>
+              <a:rPr lang="fr-FR" dirty="0">
+                <a:solidFill>
+                  <a:schemeClr val="accent1"/>
+                </a:solidFill>
+                <a:latin typeface="Cambria" panose="02040503050406030204" pitchFamily="18" charset="0"/>
+                <a:hlinkClick r:id="rId5"/>
+              </a:rPr>
               <a:t>https://</a:t>
             </a:r>
             <a:r>
-              <a:rPr lang="fr-FR" dirty="0" err="1"/>
-              <a:t>experiments.withgoogle.com</a:t>
-            </a:r>
-            <a:r>
-              <a:rPr lang="fr-FR" dirty="0"/>
-              <a:t>/collection/ai</a:t>
-            </a:r>
-          </a:p>
-        </p:txBody>
-      </p:sp>
-      <p:sp>
-        <p:nvSpPr>
-          <p:cNvPr id="6" name="Rectangle 5">
+              <a:rPr lang="fr-FR" dirty="0" err="1">
+                <a:solidFill>
+                  <a:schemeClr val="accent1"/>
+                </a:solidFill>
+                <a:latin typeface="Cambria" panose="02040503050406030204" pitchFamily="18" charset="0"/>
+                <a:hlinkClick r:id="rId5"/>
+              </a:rPr>
+              <a:t>teachablemachine.withgoogle.com</a:t>
+            </a:r>
+            <a:r>
+              <a:rPr lang="fr-FR" dirty="0">
+                <a:solidFill>
+                  <a:schemeClr val="accent1"/>
+                </a:solidFill>
+                <a:latin typeface="Cambria" panose="02040503050406030204" pitchFamily="18" charset="0"/>
+                <a:hlinkClick r:id="rId5"/>
+              </a:rPr>
+              <a:t>/</a:t>
+            </a:r>
+            <a:br>
+              <a:rPr lang="fr-FR" dirty="0">
+                <a:solidFill>
+                  <a:schemeClr val="accent1"/>
+                </a:solidFill>
+                <a:latin typeface="Cambria" panose="02040503050406030204" pitchFamily="18" charset="0"/>
+                <a:hlinkClick r:id="rId5"/>
+              </a:rPr>
+            </a:br>
+            <a:endParaRPr lang="fr-FR" dirty="0"/>
+          </a:p>
+        </p:txBody>
+      </p:sp>
+      <p:sp>
+        <p:nvSpPr>
+          <p:cNvPr id="14" name="Rectangle 13">
             <a:extLst>
               <a:ext uri="{FF2B5EF4-FFF2-40B4-BE49-F238E27FC236}">
-                <a16:creationId xmlns:a16="http://schemas.microsoft.com/office/drawing/2014/main" id="{4D579049-868E-0A4C-B015-84F5C4BAD38B}"/>
+                <a16:creationId xmlns:a16="http://schemas.microsoft.com/office/drawing/2014/main" id="{DCA7C25E-C2CE-7143-8EA0-D18B76E3FB52}"/>
               </a:ext>
             </a:extLst>
           </p:cNvPr>
@@ -3890,8 +4777,8 @@
         </p:nvSpPr>
         <p:spPr>
           <a:xfrm>
-            <a:off x="3507288" y="4417338"/>
-            <a:ext cx="4727448" cy="369332"/>
+            <a:off x="6334531" y="2706646"/>
+            <a:ext cx="3619261" cy="369332"/>
           </a:xfrm>
           <a:prstGeom prst="rect">
             <a:avLst/>
@@ -3904,26 +4791,145 @@
           <a:lstStyle/>
           <a:p>
             <a:r>
-              <a:rPr lang="fr-FR" dirty="0"/>
-              <a:t>https://</a:t>
-            </a:r>
-            <a:r>
-              <a:rPr lang="fr-FR" dirty="0" err="1"/>
-              <a:t>aidemos.microsoft.com</a:t>
-            </a:r>
-            <a:r>
-              <a:rPr lang="fr-FR" dirty="0"/>
-              <a:t>/face-recognition</a:t>
-            </a:r>
-          </a:p>
-        </p:txBody>
-      </p:sp>
-      <p:sp>
-        <p:nvSpPr>
-          <p:cNvPr id="7" name="Rectangle 6">
+              <a:rPr lang="fr-FR" dirty="0">
+                <a:solidFill>
+                  <a:schemeClr val="accent1"/>
+                </a:solidFill>
+                <a:latin typeface="Cambria" panose="02040503050406030204" pitchFamily="18" charset="0"/>
+                <a:hlinkClick r:id="rId6"/>
+              </a:rPr>
+              <a:t>https://quickdraw.withgoogle.com</a:t>
+            </a:r>
+            <a:endParaRPr lang="fr-FR" dirty="0">
+              <a:solidFill>
+                <a:schemeClr val="accent1"/>
+              </a:solidFill>
+              <a:latin typeface="Cambria" panose="02040503050406030204" pitchFamily="18" charset="0"/>
+            </a:endParaRPr>
+          </a:p>
+        </p:txBody>
+      </p:sp>
+    </p:spTree>
+    <p:extLst>
+      <p:ext uri="{BB962C8B-B14F-4D97-AF65-F5344CB8AC3E}">
+        <p14:creationId xmlns:p14="http://schemas.microsoft.com/office/powerpoint/2010/main" val="328169829"/>
+      </p:ext>
+    </p:extLst>
+  </p:cSld>
+  <p:clrMapOvr>
+    <a:masterClrMapping/>
+  </p:clrMapOvr>
+  <mc:AlternateContent xmlns:mc="http://schemas.openxmlformats.org/markup-compatibility/2006" xmlns:p14="http://schemas.microsoft.com/office/powerpoint/2010/main">
+    <mc:Choice Requires="p14">
+      <p:transition spd="med" p14:dur="700">
+        <p:fade/>
+      </p:transition>
+    </mc:Choice>
+    <mc:Fallback xmlns="">
+      <p:transition spd="med">
+        <p:fade/>
+      </p:transition>
+    </mc:Fallback>
+  </mc:AlternateContent>
+</p:sld>
+</file>
+
+<file path=ppt/slides/slide5.xml><?xml version="1.0" encoding="utf-8"?>
+<p:sld xmlns:a="http://schemas.openxmlformats.org/drawingml/2006/main" xmlns:r="http://schemas.openxmlformats.org/officeDocument/2006/relationships" xmlns:p="http://schemas.openxmlformats.org/presentationml/2006/main">
+  <p:cSld>
+    <p:spTree>
+      <p:nvGrpSpPr>
+        <p:cNvPr id="1" name=""/>
+        <p:cNvGrpSpPr/>
+        <p:nvPr/>
+      </p:nvGrpSpPr>
+      <p:grpSpPr>
+        <a:xfrm>
+          <a:off x="0" y="0"/>
+          <a:ext cx="0" cy="0"/>
+          <a:chOff x="0" y="0"/>
+          <a:chExt cx="0" cy="0"/>
+        </a:xfrm>
+      </p:grpSpPr>
+      <p:sp>
+        <p:nvSpPr>
+          <p:cNvPr id="8" name="TextBox 7"/>
+          <p:cNvSpPr txBox="1"/>
+          <p:nvPr/>
+        </p:nvSpPr>
+        <p:spPr>
+          <a:xfrm>
+            <a:off x="1271768" y="1115051"/>
+            <a:ext cx="9196386" cy="553998"/>
+          </a:xfrm>
+          <a:prstGeom prst="rect">
+            <a:avLst/>
+          </a:prstGeom>
+          <a:noFill/>
+        </p:spPr>
+        <p:txBody>
+          <a:bodyPr wrap="square" rtlCol="0">
+            <a:spAutoFit/>
+          </a:bodyPr>
+          <a:lstStyle/>
+          <a:p>
+            <a:r>
+              <a:rPr lang="en-US" sz="3000" b="1" dirty="0">
+                <a:solidFill>
+                  <a:schemeClr val="accent1"/>
+                </a:solidFill>
+                <a:latin typeface="Cambria" panose="02040503050406030204" pitchFamily="18" charset="0"/>
+              </a:rPr>
+              <a:t>AI DEMOS</a:t>
+            </a:r>
+          </a:p>
+        </p:txBody>
+      </p:sp>
+      <p:cxnSp>
+        <p:nvCxnSpPr>
+          <p:cNvPr id="5" name="Straight Connector 4">
             <a:extLst>
               <a:ext uri="{FF2B5EF4-FFF2-40B4-BE49-F238E27FC236}">
-                <a16:creationId xmlns:a16="http://schemas.microsoft.com/office/drawing/2014/main" id="{74DD04B3-B8F2-E64C-B5B6-85839F411741}"/>
+                <a16:creationId xmlns:a16="http://schemas.microsoft.com/office/drawing/2014/main" id="{42A41E69-7588-1141-85AB-3E64FCF88D3D}"/>
+              </a:ext>
+            </a:extLst>
+          </p:cNvPr>
+          <p:cNvCxnSpPr>
+            <a:cxnSpLocks/>
+          </p:cNvCxnSpPr>
+          <p:nvPr/>
+        </p:nvCxnSpPr>
+        <p:spPr>
+          <a:xfrm>
+            <a:off x="1378101" y="1753299"/>
+            <a:ext cx="9891879" cy="0"/>
+          </a:xfrm>
+          <a:prstGeom prst="line">
+            <a:avLst/>
+          </a:prstGeom>
+          <a:ln w="12700"/>
+        </p:spPr>
+        <p:style>
+          <a:lnRef idx="1">
+            <a:schemeClr val="accent1"/>
+          </a:lnRef>
+          <a:fillRef idx="0">
+            <a:schemeClr val="accent1"/>
+          </a:fillRef>
+          <a:effectRef idx="0">
+            <a:schemeClr val="accent1"/>
+          </a:effectRef>
+          <a:fontRef idx="minor">
+            <a:schemeClr val="tx1"/>
+          </a:fontRef>
+        </p:style>
+      </p:cxnSp>
+      <p:sp>
+        <p:nvSpPr>
+          <p:cNvPr id="9" name="Rectangle 8">
+            <a:extLst>
+              <a:ext uri="{FF2B5EF4-FFF2-40B4-BE49-F238E27FC236}">
+                <a16:creationId xmlns:a16="http://schemas.microsoft.com/office/drawing/2014/main" id="{5091DD16-C5AD-F649-A0C0-391AD084355F}"/>
               </a:ext>
             </a:extLst>
           </p:cNvPr>
@@ -3932,8 +4938,8 @@
         </p:nvSpPr>
         <p:spPr>
           <a:xfrm>
-            <a:off x="3507288" y="4135398"/>
-            <a:ext cx="3199594" cy="369332"/>
+            <a:off x="6673596" y="1846300"/>
+            <a:ext cx="3199594" cy="646331"/>
           </a:xfrm>
           <a:prstGeom prst="rect">
             <a:avLst/>
@@ -3946,26 +4952,74 @@
           <a:lstStyle/>
           <a:p>
             <a:r>
-              <a:rPr lang="fr-FR" dirty="0"/>
+              <a:rPr lang="fr-FR" dirty="0">
+                <a:hlinkClick r:id="rId3"/>
+              </a:rPr>
               <a:t>https://</a:t>
             </a:r>
             <a:r>
-              <a:rPr lang="fr-FR" dirty="0" err="1"/>
+              <a:rPr lang="fr-FR" dirty="0" err="1">
+                <a:hlinkClick r:id="rId3"/>
+              </a:rPr>
               <a:t>aidemos.microsoft.com</a:t>
             </a:r>
             <a:r>
-              <a:rPr lang="fr-FR" dirty="0"/>
+              <a:rPr lang="fr-FR" dirty="0">
+                <a:hlinkClick r:id="rId3"/>
+              </a:rPr>
               <a:t>/</a:t>
             </a:r>
-          </a:p>
-        </p:txBody>
-      </p:sp>
-      <p:sp>
-        <p:nvSpPr>
-          <p:cNvPr id="8" name="Rectangle 7">
+            <a:endParaRPr lang="fr-FR" dirty="0"/>
+          </a:p>
+          <a:p>
+            <a:pPr marL="342900" indent="-342900">
+              <a:buFont typeface="+mj-lt"/>
+              <a:buAutoNum type="arabicPeriod"/>
+            </a:pPr>
+            <a:endParaRPr lang="fr-FR" b="1" dirty="0">
+              <a:solidFill>
+                <a:schemeClr val="accent1"/>
+              </a:solidFill>
+            </a:endParaRPr>
+          </a:p>
+        </p:txBody>
+      </p:sp>
+      <p:pic>
+        <p:nvPicPr>
+          <p:cNvPr id="4" name="Picture 3">
             <a:extLst>
               <a:ext uri="{FF2B5EF4-FFF2-40B4-BE49-F238E27FC236}">
-                <a16:creationId xmlns:a16="http://schemas.microsoft.com/office/drawing/2014/main" id="{AA3D2EFD-0198-594A-A34E-B66123E9EC98}"/>
+                <a16:creationId xmlns:a16="http://schemas.microsoft.com/office/drawing/2014/main" id="{2E533B5B-1EF5-AD41-A6EA-3EBA98175D0D}"/>
+              </a:ext>
+            </a:extLst>
+          </p:cNvPr>
+          <p:cNvPicPr>
+            <a:picLocks noChangeAspect="1"/>
+          </p:cNvPicPr>
+          <p:nvPr/>
+        </p:nvPicPr>
+        <p:blipFill>
+          <a:blip r:embed="rId4"/>
+          <a:stretch>
+            <a:fillRect/>
+          </a:stretch>
+        </p:blipFill>
+        <p:spPr>
+          <a:xfrm>
+            <a:off x="1378101" y="1935626"/>
+            <a:ext cx="4792564" cy="4434694"/>
+          </a:xfrm>
+          <a:prstGeom prst="rect">
+            <a:avLst/>
+          </a:prstGeom>
+        </p:spPr>
+      </p:pic>
+      <p:sp>
+        <p:nvSpPr>
+          <p:cNvPr id="7" name="Rectangle 6">
+            <a:extLst>
+              <a:ext uri="{FF2B5EF4-FFF2-40B4-BE49-F238E27FC236}">
+                <a16:creationId xmlns:a16="http://schemas.microsoft.com/office/drawing/2014/main" id="{F8FED87C-19B5-5248-9838-E2A23AA30F7E}"/>
               </a:ext>
             </a:extLst>
           </p:cNvPr>
@@ -3974,8 +5028,8 @@
         </p:nvSpPr>
         <p:spPr>
           <a:xfrm>
-            <a:off x="3507288" y="4883944"/>
-            <a:ext cx="2620141" cy="369332"/>
+            <a:off x="6673596" y="2307965"/>
+            <a:ext cx="4727448" cy="369332"/>
           </a:xfrm>
           <a:prstGeom prst="rect">
             <a:avLst/>
@@ -3988,31 +5042,148 @@
           <a:lstStyle/>
           <a:p>
             <a:r>
-              <a:rPr lang="fr-FR" dirty="0"/>
+              <a:rPr lang="fr-FR" dirty="0">
+                <a:hlinkClick r:id="rId5"/>
+              </a:rPr>
               <a:t>https://</a:t>
             </a:r>
             <a:r>
-              <a:rPr lang="fr-FR" dirty="0" err="1"/>
-              <a:t>clarifai.com</a:t>
-            </a:r>
-            <a:r>
-              <a:rPr lang="fr-FR" dirty="0"/>
-              <a:t>/</a:t>
-            </a:r>
-            <a:r>
-              <a:rPr lang="fr-FR" dirty="0" err="1"/>
-              <a:t>demo</a:t>
+              <a:rPr lang="fr-FR" dirty="0" err="1">
+                <a:hlinkClick r:id="rId5"/>
+              </a:rPr>
+              <a:t>aidemos.microsoft.com</a:t>
+            </a:r>
+            <a:r>
+              <a:rPr lang="fr-FR" dirty="0">
+                <a:hlinkClick r:id="rId5"/>
+              </a:rPr>
+              <a:t>/face-recognition</a:t>
             </a:r>
             <a:endParaRPr lang="fr-FR" dirty="0"/>
           </a:p>
         </p:txBody>
       </p:sp>
+    </p:spTree>
+    <p:extLst>
+      <p:ext uri="{BB962C8B-B14F-4D97-AF65-F5344CB8AC3E}">
+        <p14:creationId xmlns:p14="http://schemas.microsoft.com/office/powerpoint/2010/main" val="1895779574"/>
+      </p:ext>
+    </p:extLst>
+  </p:cSld>
+  <p:clrMapOvr>
+    <a:masterClrMapping/>
+  </p:clrMapOvr>
+  <mc:AlternateContent xmlns:mc="http://schemas.openxmlformats.org/markup-compatibility/2006" xmlns:p14="http://schemas.microsoft.com/office/powerpoint/2010/main">
+    <mc:Choice Requires="p14">
+      <p:transition spd="med" p14:dur="700">
+        <p:fade/>
+      </p:transition>
+    </mc:Choice>
+    <mc:Fallback xmlns="">
+      <p:transition spd="med">
+        <p:fade/>
+      </p:transition>
+    </mc:Fallback>
+  </mc:AlternateContent>
+</p:sld>
+</file>
+
+<file path=ppt/slides/slide6.xml><?xml version="1.0" encoding="utf-8"?>
+<p:sld xmlns:a="http://schemas.openxmlformats.org/drawingml/2006/main" xmlns:r="http://schemas.openxmlformats.org/officeDocument/2006/relationships" xmlns:p="http://schemas.openxmlformats.org/presentationml/2006/main">
+  <p:cSld>
+    <p:spTree>
+      <p:nvGrpSpPr>
+        <p:cNvPr id="1" name=""/>
+        <p:cNvGrpSpPr/>
+        <p:nvPr/>
+      </p:nvGrpSpPr>
+      <p:grpSpPr>
+        <a:xfrm>
+          <a:off x="0" y="0"/>
+          <a:ext cx="0" cy="0"/>
+          <a:chOff x="0" y="0"/>
+          <a:chExt cx="0" cy="0"/>
+        </a:xfrm>
+      </p:grpSpPr>
+      <p:sp>
+        <p:nvSpPr>
+          <p:cNvPr id="8" name="TextBox 7"/>
+          <p:cNvSpPr txBox="1"/>
+          <p:nvPr/>
+        </p:nvSpPr>
+        <p:spPr>
+          <a:xfrm>
+            <a:off x="1271768" y="1115051"/>
+            <a:ext cx="9196386" cy="553998"/>
+          </a:xfrm>
+          <a:prstGeom prst="rect">
+            <a:avLst/>
+          </a:prstGeom>
+          <a:noFill/>
+        </p:spPr>
+        <p:txBody>
+          <a:bodyPr wrap="square" rtlCol="0">
+            <a:spAutoFit/>
+          </a:bodyPr>
+          <a:lstStyle/>
+          <a:p>
+            <a:r>
+              <a:rPr lang="en-US" sz="3000" b="1" dirty="0">
+                <a:solidFill>
+                  <a:schemeClr val="accent1"/>
+                </a:solidFill>
+                <a:latin typeface="Cambria" panose="02040503050406030204" pitchFamily="18" charset="0"/>
+              </a:rPr>
+              <a:t>OBJECT DETECTION</a:t>
+            </a:r>
+          </a:p>
+        </p:txBody>
+      </p:sp>
+      <p:cxnSp>
+        <p:nvCxnSpPr>
+          <p:cNvPr id="5" name="Straight Connector 4">
+            <a:extLst>
+              <a:ext uri="{FF2B5EF4-FFF2-40B4-BE49-F238E27FC236}">
+                <a16:creationId xmlns:a16="http://schemas.microsoft.com/office/drawing/2014/main" id="{42A41E69-7588-1141-85AB-3E64FCF88D3D}"/>
+              </a:ext>
+            </a:extLst>
+          </p:cNvPr>
+          <p:cNvCxnSpPr>
+            <a:cxnSpLocks/>
+          </p:cNvCxnSpPr>
+          <p:nvPr/>
+        </p:nvCxnSpPr>
+        <p:spPr>
+          <a:xfrm>
+            <a:off x="1378101" y="1753299"/>
+            <a:ext cx="9891879" cy="0"/>
+          </a:xfrm>
+          <a:prstGeom prst="line">
+            <a:avLst/>
+          </a:prstGeom>
+          <a:ln w="12700"/>
+        </p:spPr>
+        <p:style>
+          <a:lnRef idx="1">
+            <a:schemeClr val="accent1"/>
+          </a:lnRef>
+          <a:fillRef idx="0">
+            <a:schemeClr val="accent1"/>
+          </a:fillRef>
+          <a:effectRef idx="0">
+            <a:schemeClr val="accent1"/>
+          </a:effectRef>
+          <a:fontRef idx="minor">
+            <a:schemeClr val="tx1"/>
+          </a:fontRef>
+        </p:style>
+      </p:cxnSp>
       <p:sp>
         <p:nvSpPr>
           <p:cNvPr id="9" name="Rectangle 8">
             <a:extLst>
               <a:ext uri="{FF2B5EF4-FFF2-40B4-BE49-F238E27FC236}">
-                <a16:creationId xmlns:a16="http://schemas.microsoft.com/office/drawing/2014/main" id="{3D96EA6E-7C78-8B42-AA1C-6647FF83927C}"/>
+                <a16:creationId xmlns:a16="http://schemas.microsoft.com/office/drawing/2014/main" id="{5091DD16-C5AD-F649-A0C0-391AD084355F}"/>
               </a:ext>
             </a:extLst>
           </p:cNvPr>
@@ -4021,8 +5192,8 @@
         </p:nvSpPr>
         <p:spPr>
           <a:xfrm>
-            <a:off x="3554416" y="5535548"/>
-            <a:ext cx="4633191" cy="369332"/>
+            <a:off x="6673596" y="1846300"/>
+            <a:ext cx="2694520" cy="369332"/>
           </a:xfrm>
           <a:prstGeom prst="rect">
             <a:avLst/>
@@ -4035,32 +5206,794 @@
           <a:lstStyle/>
           <a:p>
             <a:r>
-              <a:rPr lang="fr-FR" dirty="0"/>
+              <a:rPr lang="fr-FR" b="1" dirty="0">
+                <a:solidFill>
+                  <a:schemeClr val="accent1"/>
+                </a:solidFill>
+                <a:hlinkClick r:id="rId3"/>
+              </a:rPr>
               <a:t>https://</a:t>
             </a:r>
             <a:r>
-              <a:rPr lang="fr-FR" dirty="0" err="1"/>
-              <a:t>watson</a:t>
-            </a:r>
-            <a:r>
-              <a:rPr lang="fr-FR" dirty="0"/>
-              <a:t>-assistant-</a:t>
-            </a:r>
-            <a:r>
-              <a:rPr lang="fr-FR" dirty="0" err="1"/>
-              <a:t>demo.ng.bluemix.net</a:t>
-            </a:r>
-            <a:r>
-              <a:rPr lang="fr-FR" dirty="0"/>
+              <a:rPr lang="fr-FR" b="1" dirty="0" err="1">
+                <a:solidFill>
+                  <a:schemeClr val="accent1"/>
+                </a:solidFill>
+                <a:hlinkClick r:id="rId3"/>
+              </a:rPr>
+              <a:t>clarifai.com</a:t>
+            </a:r>
+            <a:r>
+              <a:rPr lang="fr-FR" b="1" dirty="0">
+                <a:solidFill>
+                  <a:schemeClr val="accent1"/>
+                </a:solidFill>
+                <a:hlinkClick r:id="rId3"/>
+              </a:rPr>
               <a:t>/</a:t>
             </a:r>
-          </a:p>
-        </p:txBody>
-      </p:sp>
+            <a:r>
+              <a:rPr lang="fr-FR" b="1" dirty="0" err="1">
+                <a:solidFill>
+                  <a:schemeClr val="accent1"/>
+                </a:solidFill>
+                <a:hlinkClick r:id="rId3"/>
+              </a:rPr>
+              <a:t>demo</a:t>
+            </a:r>
+            <a:endParaRPr lang="fr-FR" b="1" dirty="0">
+              <a:solidFill>
+                <a:schemeClr val="accent1"/>
+              </a:solidFill>
+            </a:endParaRPr>
+          </a:p>
+        </p:txBody>
+      </p:sp>
+      <p:pic>
+        <p:nvPicPr>
+          <p:cNvPr id="2" name="Picture 1">
+            <a:extLst>
+              <a:ext uri="{FF2B5EF4-FFF2-40B4-BE49-F238E27FC236}">
+                <a16:creationId xmlns:a16="http://schemas.microsoft.com/office/drawing/2014/main" id="{46E00D36-D770-BB4D-B444-51F194CAF6CE}"/>
+              </a:ext>
+            </a:extLst>
+          </p:cNvPr>
+          <p:cNvPicPr>
+            <a:picLocks noChangeAspect="1"/>
+          </p:cNvPicPr>
+          <p:nvPr/>
+        </p:nvPicPr>
+        <p:blipFill>
+          <a:blip r:embed="rId4"/>
+          <a:stretch>
+            <a:fillRect/>
+          </a:stretch>
+        </p:blipFill>
+        <p:spPr>
+          <a:xfrm>
+            <a:off x="1378101" y="1971368"/>
+            <a:ext cx="4718413" cy="4261792"/>
+          </a:xfrm>
+          <a:prstGeom prst="rect">
+            <a:avLst/>
+          </a:prstGeom>
+        </p:spPr>
+      </p:pic>
     </p:spTree>
     <p:extLst>
       <p:ext uri="{BB962C8B-B14F-4D97-AF65-F5344CB8AC3E}">
-        <p14:creationId xmlns:p14="http://schemas.microsoft.com/office/powerpoint/2010/main" val="891496747"/>
+        <p14:creationId xmlns:p14="http://schemas.microsoft.com/office/powerpoint/2010/main" val="2590081035"/>
+      </p:ext>
+    </p:extLst>
+  </p:cSld>
+  <p:clrMapOvr>
+    <a:masterClrMapping/>
+  </p:clrMapOvr>
+  <mc:AlternateContent xmlns:mc="http://schemas.openxmlformats.org/markup-compatibility/2006" xmlns:p14="http://schemas.microsoft.com/office/powerpoint/2010/main">
+    <mc:Choice Requires="p14">
+      <p:transition spd="med" p14:dur="700">
+        <p:fade/>
+      </p:transition>
+    </mc:Choice>
+    <mc:Fallback xmlns="">
+      <p:transition spd="med">
+        <p:fade/>
+      </p:transition>
+    </mc:Fallback>
+  </mc:AlternateContent>
+</p:sld>
+</file>
+
+<file path=ppt/slides/slide7.xml><?xml version="1.0" encoding="utf-8"?>
+<p:sld xmlns:a="http://schemas.openxmlformats.org/drawingml/2006/main" xmlns:r="http://schemas.openxmlformats.org/officeDocument/2006/relationships" xmlns:p="http://schemas.openxmlformats.org/presentationml/2006/main">
+  <p:cSld>
+    <p:spTree>
+      <p:nvGrpSpPr>
+        <p:cNvPr id="1" name=""/>
+        <p:cNvGrpSpPr/>
+        <p:nvPr/>
+      </p:nvGrpSpPr>
+      <p:grpSpPr>
+        <a:xfrm>
+          <a:off x="0" y="0"/>
+          <a:ext cx="0" cy="0"/>
+          <a:chOff x="0" y="0"/>
+          <a:chExt cx="0" cy="0"/>
+        </a:xfrm>
+      </p:grpSpPr>
+      <p:sp>
+        <p:nvSpPr>
+          <p:cNvPr id="8" name="TextBox 7"/>
+          <p:cNvSpPr txBox="1"/>
+          <p:nvPr/>
+        </p:nvSpPr>
+        <p:spPr>
+          <a:xfrm>
+            <a:off x="1271768" y="1115051"/>
+            <a:ext cx="9196386" cy="553998"/>
+          </a:xfrm>
+          <a:prstGeom prst="rect">
+            <a:avLst/>
+          </a:prstGeom>
+          <a:noFill/>
+        </p:spPr>
+        <p:txBody>
+          <a:bodyPr wrap="square" rtlCol="0">
+            <a:spAutoFit/>
+          </a:bodyPr>
+          <a:lstStyle/>
+          <a:p>
+            <a:r>
+              <a:rPr lang="en-US" sz="3000" b="1" dirty="0">
+                <a:solidFill>
+                  <a:schemeClr val="accent1"/>
+                </a:solidFill>
+                <a:latin typeface="Cambria" panose="02040503050406030204" pitchFamily="18" charset="0"/>
+              </a:rPr>
+              <a:t>AI VIRTUAL ASSISTANT</a:t>
+            </a:r>
+          </a:p>
+        </p:txBody>
+      </p:sp>
+      <p:cxnSp>
+        <p:nvCxnSpPr>
+          <p:cNvPr id="5" name="Straight Connector 4">
+            <a:extLst>
+              <a:ext uri="{FF2B5EF4-FFF2-40B4-BE49-F238E27FC236}">
+                <a16:creationId xmlns:a16="http://schemas.microsoft.com/office/drawing/2014/main" id="{42A41E69-7588-1141-85AB-3E64FCF88D3D}"/>
+              </a:ext>
+            </a:extLst>
+          </p:cNvPr>
+          <p:cNvCxnSpPr>
+            <a:cxnSpLocks/>
+          </p:cNvCxnSpPr>
+          <p:nvPr/>
+        </p:nvCxnSpPr>
+        <p:spPr>
+          <a:xfrm>
+            <a:off x="1378101" y="1753299"/>
+            <a:ext cx="9891879" cy="0"/>
+          </a:xfrm>
+          <a:prstGeom prst="line">
+            <a:avLst/>
+          </a:prstGeom>
+          <a:ln w="12700"/>
+        </p:spPr>
+        <p:style>
+          <a:lnRef idx="1">
+            <a:schemeClr val="accent1"/>
+          </a:lnRef>
+          <a:fillRef idx="0">
+            <a:schemeClr val="accent1"/>
+          </a:fillRef>
+          <a:effectRef idx="0">
+            <a:schemeClr val="accent1"/>
+          </a:effectRef>
+          <a:fontRef idx="minor">
+            <a:schemeClr val="tx1"/>
+          </a:fontRef>
+        </p:style>
+      </p:cxnSp>
+      <p:sp>
+        <p:nvSpPr>
+          <p:cNvPr id="9" name="Rectangle 8">
+            <a:extLst>
+              <a:ext uri="{FF2B5EF4-FFF2-40B4-BE49-F238E27FC236}">
+                <a16:creationId xmlns:a16="http://schemas.microsoft.com/office/drawing/2014/main" id="{5091DD16-C5AD-F649-A0C0-391AD084355F}"/>
+              </a:ext>
+            </a:extLst>
+          </p:cNvPr>
+          <p:cNvSpPr/>
+          <p:nvPr/>
+        </p:nvSpPr>
+        <p:spPr>
+          <a:xfrm>
+            <a:off x="6673596" y="1846300"/>
+            <a:ext cx="184731" cy="369332"/>
+          </a:xfrm>
+          <a:prstGeom prst="rect">
+            <a:avLst/>
+          </a:prstGeom>
+        </p:spPr>
+        <p:txBody>
+          <a:bodyPr wrap="none">
+            <a:spAutoFit/>
+          </a:bodyPr>
+          <a:lstStyle/>
+          <a:p>
+            <a:endParaRPr lang="fr-FR" b="1" dirty="0">
+              <a:solidFill>
+                <a:schemeClr val="accent1"/>
+              </a:solidFill>
+            </a:endParaRPr>
+          </a:p>
+        </p:txBody>
+      </p:sp>
+      <p:pic>
+        <p:nvPicPr>
+          <p:cNvPr id="3" name="Picture 2">
+            <a:extLst>
+              <a:ext uri="{FF2B5EF4-FFF2-40B4-BE49-F238E27FC236}">
+                <a16:creationId xmlns:a16="http://schemas.microsoft.com/office/drawing/2014/main" id="{E0F83BD9-831F-B548-B12F-FB3EFB82FF87}"/>
+              </a:ext>
+            </a:extLst>
+          </p:cNvPr>
+          <p:cNvPicPr>
+            <a:picLocks noChangeAspect="1"/>
+          </p:cNvPicPr>
+          <p:nvPr/>
+        </p:nvPicPr>
+        <p:blipFill>
+          <a:blip r:embed="rId3"/>
+          <a:stretch>
+            <a:fillRect/>
+          </a:stretch>
+        </p:blipFill>
+        <p:spPr>
+          <a:xfrm>
+            <a:off x="1271768" y="2030966"/>
+            <a:ext cx="5197125" cy="4228839"/>
+          </a:xfrm>
+          <a:prstGeom prst="rect">
+            <a:avLst/>
+          </a:prstGeom>
+        </p:spPr>
+      </p:pic>
+      <p:sp>
+        <p:nvSpPr>
+          <p:cNvPr id="4" name="Rectangle 3">
+            <a:extLst>
+              <a:ext uri="{FF2B5EF4-FFF2-40B4-BE49-F238E27FC236}">
+                <a16:creationId xmlns:a16="http://schemas.microsoft.com/office/drawing/2014/main" id="{F6D09A60-DBA1-4345-94F3-CE4C4D5400EF}"/>
+              </a:ext>
+            </a:extLst>
+          </p:cNvPr>
+          <p:cNvSpPr/>
+          <p:nvPr/>
+        </p:nvSpPr>
+        <p:spPr>
+          <a:xfrm>
+            <a:off x="6765961" y="2030966"/>
+            <a:ext cx="4633191" cy="369332"/>
+          </a:xfrm>
+          <a:prstGeom prst="rect">
+            <a:avLst/>
+          </a:prstGeom>
+        </p:spPr>
+        <p:txBody>
+          <a:bodyPr wrap="none">
+            <a:spAutoFit/>
+          </a:bodyPr>
+          <a:lstStyle/>
+          <a:p>
+            <a:r>
+              <a:rPr lang="fr-FR" dirty="0">
+                <a:hlinkClick r:id="rId4"/>
+              </a:rPr>
+              <a:t>https://</a:t>
+            </a:r>
+            <a:r>
+              <a:rPr lang="fr-FR" dirty="0" err="1">
+                <a:hlinkClick r:id="rId4"/>
+              </a:rPr>
+              <a:t>watson</a:t>
+            </a:r>
+            <a:r>
+              <a:rPr lang="fr-FR" dirty="0">
+                <a:hlinkClick r:id="rId4"/>
+              </a:rPr>
+              <a:t>-assistant-</a:t>
+            </a:r>
+            <a:r>
+              <a:rPr lang="fr-FR" dirty="0" err="1">
+                <a:hlinkClick r:id="rId4"/>
+              </a:rPr>
+              <a:t>demo.ng.bluemix.net</a:t>
+            </a:r>
+            <a:r>
+              <a:rPr lang="fr-FR" dirty="0">
+                <a:hlinkClick r:id="rId4"/>
+              </a:rPr>
+              <a:t>/</a:t>
+            </a:r>
+            <a:endParaRPr lang="fr-FR" dirty="0"/>
+          </a:p>
+        </p:txBody>
+      </p:sp>
+    </p:spTree>
+    <p:extLst>
+      <p:ext uri="{BB962C8B-B14F-4D97-AF65-F5344CB8AC3E}">
+        <p14:creationId xmlns:p14="http://schemas.microsoft.com/office/powerpoint/2010/main" val="2186227554"/>
+      </p:ext>
+    </p:extLst>
+  </p:cSld>
+  <p:clrMapOvr>
+    <a:masterClrMapping/>
+  </p:clrMapOvr>
+  <mc:AlternateContent xmlns:mc="http://schemas.openxmlformats.org/markup-compatibility/2006" xmlns:p14="http://schemas.microsoft.com/office/powerpoint/2010/main">
+    <mc:Choice Requires="p14">
+      <p:transition spd="med" p14:dur="700">
+        <p:fade/>
+      </p:transition>
+    </mc:Choice>
+    <mc:Fallback xmlns="">
+      <p:transition spd="med">
+        <p:fade/>
+      </p:transition>
+    </mc:Fallback>
+  </mc:AlternateContent>
+</p:sld>
+</file>
+
+<file path=ppt/slides/slide8.xml><?xml version="1.0" encoding="utf-8"?>
+<p:sld xmlns:a="http://schemas.openxmlformats.org/drawingml/2006/main" xmlns:r="http://schemas.openxmlformats.org/officeDocument/2006/relationships" xmlns:p="http://schemas.openxmlformats.org/presentationml/2006/main">
+  <p:cSld>
+    <p:spTree>
+      <p:nvGrpSpPr>
+        <p:cNvPr id="1" name=""/>
+        <p:cNvGrpSpPr/>
+        <p:nvPr/>
+      </p:nvGrpSpPr>
+      <p:grpSpPr>
+        <a:xfrm>
+          <a:off x="0" y="0"/>
+          <a:ext cx="0" cy="0"/>
+          <a:chOff x="0" y="0"/>
+          <a:chExt cx="0" cy="0"/>
+        </a:xfrm>
+      </p:grpSpPr>
+      <p:sp>
+        <p:nvSpPr>
+          <p:cNvPr id="8" name="TextBox 7"/>
+          <p:cNvSpPr txBox="1"/>
+          <p:nvPr/>
+        </p:nvSpPr>
+        <p:spPr>
+          <a:xfrm>
+            <a:off x="1271768" y="1115051"/>
+            <a:ext cx="9196386" cy="553998"/>
+          </a:xfrm>
+          <a:prstGeom prst="rect">
+            <a:avLst/>
+          </a:prstGeom>
+          <a:noFill/>
+        </p:spPr>
+        <p:txBody>
+          <a:bodyPr wrap="square" rtlCol="0">
+            <a:spAutoFit/>
+          </a:bodyPr>
+          <a:lstStyle/>
+          <a:p>
+            <a:r>
+              <a:rPr lang="en-US" sz="3000" b="1" dirty="0">
+                <a:solidFill>
+                  <a:schemeClr val="accent1"/>
+                </a:solidFill>
+                <a:latin typeface="Cambria" panose="02040503050406030204" pitchFamily="18" charset="0"/>
+              </a:rPr>
+              <a:t>AI VIRTUAL ASSISTANT</a:t>
+            </a:r>
+          </a:p>
+        </p:txBody>
+      </p:sp>
+      <p:cxnSp>
+        <p:nvCxnSpPr>
+          <p:cNvPr id="5" name="Straight Connector 4">
+            <a:extLst>
+              <a:ext uri="{FF2B5EF4-FFF2-40B4-BE49-F238E27FC236}">
+                <a16:creationId xmlns:a16="http://schemas.microsoft.com/office/drawing/2014/main" id="{42A41E69-7588-1141-85AB-3E64FCF88D3D}"/>
+              </a:ext>
+            </a:extLst>
+          </p:cNvPr>
+          <p:cNvCxnSpPr>
+            <a:cxnSpLocks/>
+          </p:cNvCxnSpPr>
+          <p:nvPr/>
+        </p:nvCxnSpPr>
+        <p:spPr>
+          <a:xfrm>
+            <a:off x="1378101" y="1753299"/>
+            <a:ext cx="9891879" cy="0"/>
+          </a:xfrm>
+          <a:prstGeom prst="line">
+            <a:avLst/>
+          </a:prstGeom>
+          <a:ln w="12700"/>
+        </p:spPr>
+        <p:style>
+          <a:lnRef idx="1">
+            <a:schemeClr val="accent1"/>
+          </a:lnRef>
+          <a:fillRef idx="0">
+            <a:schemeClr val="accent1"/>
+          </a:fillRef>
+          <a:effectRef idx="0">
+            <a:schemeClr val="accent1"/>
+          </a:effectRef>
+          <a:fontRef idx="minor">
+            <a:schemeClr val="tx1"/>
+          </a:fontRef>
+        </p:style>
+      </p:cxnSp>
+      <p:sp>
+        <p:nvSpPr>
+          <p:cNvPr id="9" name="Rectangle 8">
+            <a:extLst>
+              <a:ext uri="{FF2B5EF4-FFF2-40B4-BE49-F238E27FC236}">
+                <a16:creationId xmlns:a16="http://schemas.microsoft.com/office/drawing/2014/main" id="{5091DD16-C5AD-F649-A0C0-391AD084355F}"/>
+              </a:ext>
+            </a:extLst>
+          </p:cNvPr>
+          <p:cNvSpPr/>
+          <p:nvPr/>
+        </p:nvSpPr>
+        <p:spPr>
+          <a:xfrm>
+            <a:off x="6673596" y="1846300"/>
+            <a:ext cx="184731" cy="369332"/>
+          </a:xfrm>
+          <a:prstGeom prst="rect">
+            <a:avLst/>
+          </a:prstGeom>
+        </p:spPr>
+        <p:txBody>
+          <a:bodyPr wrap="none">
+            <a:spAutoFit/>
+          </a:bodyPr>
+          <a:lstStyle/>
+          <a:p>
+            <a:endParaRPr lang="fr-FR" b="1" dirty="0">
+              <a:solidFill>
+                <a:schemeClr val="accent1"/>
+              </a:solidFill>
+            </a:endParaRPr>
+          </a:p>
+        </p:txBody>
+      </p:sp>
+      <p:pic>
+        <p:nvPicPr>
+          <p:cNvPr id="3" name="Picture 2">
+            <a:extLst>
+              <a:ext uri="{FF2B5EF4-FFF2-40B4-BE49-F238E27FC236}">
+                <a16:creationId xmlns:a16="http://schemas.microsoft.com/office/drawing/2014/main" id="{E0F83BD9-831F-B548-B12F-FB3EFB82FF87}"/>
+              </a:ext>
+            </a:extLst>
+          </p:cNvPr>
+          <p:cNvPicPr>
+            <a:picLocks noChangeAspect="1"/>
+          </p:cNvPicPr>
+          <p:nvPr/>
+        </p:nvPicPr>
+        <p:blipFill>
+          <a:blip r:embed="rId3"/>
+          <a:stretch>
+            <a:fillRect/>
+          </a:stretch>
+        </p:blipFill>
+        <p:spPr>
+          <a:xfrm>
+            <a:off x="1271768" y="2030966"/>
+            <a:ext cx="5197125" cy="4228839"/>
+          </a:xfrm>
+          <a:prstGeom prst="rect">
+            <a:avLst/>
+          </a:prstGeom>
+        </p:spPr>
+      </p:pic>
+      <p:sp>
+        <p:nvSpPr>
+          <p:cNvPr id="4" name="Rectangle 3">
+            <a:extLst>
+              <a:ext uri="{FF2B5EF4-FFF2-40B4-BE49-F238E27FC236}">
+                <a16:creationId xmlns:a16="http://schemas.microsoft.com/office/drawing/2014/main" id="{F6D09A60-DBA1-4345-94F3-CE4C4D5400EF}"/>
+              </a:ext>
+            </a:extLst>
+          </p:cNvPr>
+          <p:cNvSpPr/>
+          <p:nvPr/>
+        </p:nvSpPr>
+        <p:spPr>
+          <a:xfrm>
+            <a:off x="6765961" y="2030966"/>
+            <a:ext cx="4633191" cy="369332"/>
+          </a:xfrm>
+          <a:prstGeom prst="rect">
+            <a:avLst/>
+          </a:prstGeom>
+        </p:spPr>
+        <p:txBody>
+          <a:bodyPr wrap="none">
+            <a:spAutoFit/>
+          </a:bodyPr>
+          <a:lstStyle/>
+          <a:p>
+            <a:r>
+              <a:rPr lang="fr-FR" dirty="0">
+                <a:hlinkClick r:id="rId4"/>
+              </a:rPr>
+              <a:t>https://</a:t>
+            </a:r>
+            <a:r>
+              <a:rPr lang="fr-FR" dirty="0" err="1">
+                <a:hlinkClick r:id="rId4"/>
+              </a:rPr>
+              <a:t>watson</a:t>
+            </a:r>
+            <a:r>
+              <a:rPr lang="fr-FR" dirty="0">
+                <a:hlinkClick r:id="rId4"/>
+              </a:rPr>
+              <a:t>-assistant-</a:t>
+            </a:r>
+            <a:r>
+              <a:rPr lang="fr-FR" dirty="0" err="1">
+                <a:hlinkClick r:id="rId4"/>
+              </a:rPr>
+              <a:t>demo.ng.bluemix.net</a:t>
+            </a:r>
+            <a:r>
+              <a:rPr lang="fr-FR" dirty="0">
+                <a:hlinkClick r:id="rId4"/>
+              </a:rPr>
+              <a:t>/</a:t>
+            </a:r>
+            <a:endParaRPr lang="fr-FR" dirty="0"/>
+          </a:p>
+        </p:txBody>
+      </p:sp>
+    </p:spTree>
+    <p:extLst>
+      <p:ext uri="{BB962C8B-B14F-4D97-AF65-F5344CB8AC3E}">
+        <p14:creationId xmlns:p14="http://schemas.microsoft.com/office/powerpoint/2010/main" val="2496095326"/>
+      </p:ext>
+    </p:extLst>
+  </p:cSld>
+  <p:clrMapOvr>
+    <a:masterClrMapping/>
+  </p:clrMapOvr>
+  <mc:AlternateContent xmlns:mc="http://schemas.openxmlformats.org/markup-compatibility/2006" xmlns:p14="http://schemas.microsoft.com/office/powerpoint/2010/main">
+    <mc:Choice Requires="p14">
+      <p:transition spd="med" p14:dur="700">
+        <p:fade/>
+      </p:transition>
+    </mc:Choice>
+    <mc:Fallback xmlns="">
+      <p:transition spd="med">
+        <p:fade/>
+      </p:transition>
+    </mc:Fallback>
+  </mc:AlternateContent>
+</p:sld>
+</file>
+
+<file path=ppt/slides/slide9.xml><?xml version="1.0" encoding="utf-8"?>
+<p:sld xmlns:a="http://schemas.openxmlformats.org/drawingml/2006/main" xmlns:r="http://schemas.openxmlformats.org/officeDocument/2006/relationships" xmlns:p="http://schemas.openxmlformats.org/presentationml/2006/main">
+  <p:cSld>
+    <p:spTree>
+      <p:nvGrpSpPr>
+        <p:cNvPr id="1" name=""/>
+        <p:cNvGrpSpPr/>
+        <p:nvPr/>
+      </p:nvGrpSpPr>
+      <p:grpSpPr>
+        <a:xfrm>
+          <a:off x="0" y="0"/>
+          <a:ext cx="0" cy="0"/>
+          <a:chOff x="0" y="0"/>
+          <a:chExt cx="0" cy="0"/>
+        </a:xfrm>
+      </p:grpSpPr>
+      <p:sp>
+        <p:nvSpPr>
+          <p:cNvPr id="8" name="TextBox 7"/>
+          <p:cNvSpPr txBox="1"/>
+          <p:nvPr/>
+        </p:nvSpPr>
+        <p:spPr>
+          <a:xfrm>
+            <a:off x="1271768" y="1115051"/>
+            <a:ext cx="9196386" cy="553998"/>
+          </a:xfrm>
+          <a:prstGeom prst="rect">
+            <a:avLst/>
+          </a:prstGeom>
+          <a:noFill/>
+        </p:spPr>
+        <p:txBody>
+          <a:bodyPr wrap="square" rtlCol="0">
+            <a:spAutoFit/>
+          </a:bodyPr>
+          <a:lstStyle/>
+          <a:p>
+            <a:r>
+              <a:rPr lang="en-US" sz="3000" b="1" dirty="0">
+                <a:solidFill>
+                  <a:schemeClr val="accent1"/>
+                </a:solidFill>
+                <a:latin typeface="Cambria" panose="02040503050406030204" pitchFamily="18" charset="0"/>
+              </a:rPr>
+              <a:t>BOTS OR NOT BOTS</a:t>
+            </a:r>
+          </a:p>
+        </p:txBody>
+      </p:sp>
+      <p:cxnSp>
+        <p:nvCxnSpPr>
+          <p:cNvPr id="5" name="Straight Connector 4">
+            <a:extLst>
+              <a:ext uri="{FF2B5EF4-FFF2-40B4-BE49-F238E27FC236}">
+                <a16:creationId xmlns:a16="http://schemas.microsoft.com/office/drawing/2014/main" id="{42A41E69-7588-1141-85AB-3E64FCF88D3D}"/>
+              </a:ext>
+            </a:extLst>
+          </p:cNvPr>
+          <p:cNvCxnSpPr>
+            <a:cxnSpLocks/>
+          </p:cNvCxnSpPr>
+          <p:nvPr/>
+        </p:nvCxnSpPr>
+        <p:spPr>
+          <a:xfrm>
+            <a:off x="1378101" y="1753299"/>
+            <a:ext cx="9366099" cy="0"/>
+          </a:xfrm>
+          <a:prstGeom prst="line">
+            <a:avLst/>
+          </a:prstGeom>
+          <a:ln w="12700"/>
+        </p:spPr>
+        <p:style>
+          <a:lnRef idx="1">
+            <a:schemeClr val="accent1"/>
+          </a:lnRef>
+          <a:fillRef idx="0">
+            <a:schemeClr val="accent1"/>
+          </a:fillRef>
+          <a:effectRef idx="0">
+            <a:schemeClr val="accent1"/>
+          </a:effectRef>
+          <a:fontRef idx="minor">
+            <a:schemeClr val="tx1"/>
+          </a:fontRef>
+        </p:style>
+      </p:cxnSp>
+      <p:sp>
+        <p:nvSpPr>
+          <p:cNvPr id="9" name="Rectangle 8">
+            <a:extLst>
+              <a:ext uri="{FF2B5EF4-FFF2-40B4-BE49-F238E27FC236}">
+                <a16:creationId xmlns:a16="http://schemas.microsoft.com/office/drawing/2014/main" id="{5091DD16-C5AD-F649-A0C0-391AD084355F}"/>
+              </a:ext>
+            </a:extLst>
+          </p:cNvPr>
+          <p:cNvSpPr/>
+          <p:nvPr/>
+        </p:nvSpPr>
+        <p:spPr>
+          <a:xfrm>
+            <a:off x="6673596" y="1846300"/>
+            <a:ext cx="184731" cy="369332"/>
+          </a:xfrm>
+          <a:prstGeom prst="rect">
+            <a:avLst/>
+          </a:prstGeom>
+        </p:spPr>
+        <p:txBody>
+          <a:bodyPr wrap="none">
+            <a:spAutoFit/>
+          </a:bodyPr>
+          <a:lstStyle/>
+          <a:p>
+            <a:endParaRPr lang="fr-FR" b="1" dirty="0">
+              <a:solidFill>
+                <a:schemeClr val="accent1"/>
+              </a:solidFill>
+            </a:endParaRPr>
+          </a:p>
+        </p:txBody>
+      </p:sp>
+      <p:pic>
+        <p:nvPicPr>
+          <p:cNvPr id="2" name="Picture 1">
+            <a:extLst>
+              <a:ext uri="{FF2B5EF4-FFF2-40B4-BE49-F238E27FC236}">
+                <a16:creationId xmlns:a16="http://schemas.microsoft.com/office/drawing/2014/main" id="{A7F8B163-7290-AA4D-84B9-C0F105061DB7}"/>
+              </a:ext>
+            </a:extLst>
+          </p:cNvPr>
+          <p:cNvPicPr>
+            <a:picLocks noChangeAspect="1"/>
+          </p:cNvPicPr>
+          <p:nvPr/>
+        </p:nvPicPr>
+        <p:blipFill>
+          <a:blip r:embed="rId3"/>
+          <a:stretch>
+            <a:fillRect/>
+          </a:stretch>
+        </p:blipFill>
+        <p:spPr>
+          <a:xfrm>
+            <a:off x="1378101" y="1935252"/>
+            <a:ext cx="5715625" cy="4549368"/>
+          </a:xfrm>
+          <a:prstGeom prst="rect">
+            <a:avLst/>
+          </a:prstGeom>
+        </p:spPr>
+      </p:pic>
+      <p:sp>
+        <p:nvSpPr>
+          <p:cNvPr id="6" name="Rectangle 5">
+            <a:extLst>
+              <a:ext uri="{FF2B5EF4-FFF2-40B4-BE49-F238E27FC236}">
+                <a16:creationId xmlns:a16="http://schemas.microsoft.com/office/drawing/2014/main" id="{0A588E61-65E0-E641-BC2D-650FFC397B50}"/>
+              </a:ext>
+            </a:extLst>
+          </p:cNvPr>
+          <p:cNvSpPr/>
+          <p:nvPr/>
+        </p:nvSpPr>
+        <p:spPr>
+          <a:xfrm>
+            <a:off x="7598065" y="1935252"/>
+            <a:ext cx="3267561" cy="369332"/>
+          </a:xfrm>
+          <a:prstGeom prst="rect">
+            <a:avLst/>
+          </a:prstGeom>
+        </p:spPr>
+        <p:txBody>
+          <a:bodyPr wrap="none">
+            <a:spAutoFit/>
+          </a:bodyPr>
+          <a:lstStyle/>
+          <a:p>
+            <a:r>
+              <a:rPr lang="fr-FR" dirty="0">
+                <a:hlinkClick r:id="rId4"/>
+              </a:rPr>
+              <a:t>http://</a:t>
+            </a:r>
+            <a:r>
+              <a:rPr lang="fr-FR" dirty="0" err="1">
+                <a:hlinkClick r:id="rId4"/>
+              </a:rPr>
+              <a:t>botpoet.com</a:t>
+            </a:r>
+            <a:r>
+              <a:rPr lang="fr-FR" dirty="0">
+                <a:hlinkClick r:id="rId4"/>
+              </a:rPr>
+              <a:t>/vote/all-art/</a:t>
+            </a:r>
+            <a:endParaRPr lang="fr-FR" dirty="0"/>
+          </a:p>
+        </p:txBody>
+      </p:sp>
+    </p:spTree>
+    <p:extLst>
+      <p:ext uri="{BB962C8B-B14F-4D97-AF65-F5344CB8AC3E}">
+        <p14:creationId xmlns:p14="http://schemas.microsoft.com/office/powerpoint/2010/main" val="403327619"/>
       </p:ext>
     </p:extLst>
   </p:cSld>

</xml_diff>